<commit_message>
Modify "addressbook", "address book", "person" and "persons" to "travelbuddy", "place" or "places"
</commit_message>
<xml_diff>
--- a/docs/diagrams/Command_Add_SequenceDiagram.pptx
+++ b/docs/diagrams/Command_Add_SequenceDiagram.pptx
@@ -208,7 +208,7 @@
           <a:p>
             <a:fld id="{F5CC4B3F-88C1-4FFA-B1B6-F41C21DC6924}" type="datetimeFigureOut">
               <a:rPr lang="en-US" smtClean="0"/>
-              <a:t>3/19/2019</a:t>
+              <a:t>22-Mar-19</a:t>
             </a:fld>
             <a:endParaRPr lang="en-US"/>
           </a:p>
@@ -738,7 +738,7 @@
           <a:p>
             <a:fld id="{78C97017-6FC3-485B-9764-EAC9E56C1D49}" type="datetimeFigureOut">
               <a:rPr lang="en-US" smtClean="0"/>
-              <a:t>3/19/2019</a:t>
+              <a:t>22-Mar-19</a:t>
             </a:fld>
             <a:endParaRPr lang="en-US"/>
           </a:p>
@@ -906,7 +906,7 @@
           <a:p>
             <a:fld id="{78C97017-6FC3-485B-9764-EAC9E56C1D49}" type="datetimeFigureOut">
               <a:rPr lang="en-US" smtClean="0"/>
-              <a:t>3/19/2019</a:t>
+              <a:t>22-Mar-19</a:t>
             </a:fld>
             <a:endParaRPr lang="en-US"/>
           </a:p>
@@ -1084,7 +1084,7 @@
           <a:p>
             <a:fld id="{78C97017-6FC3-485B-9764-EAC9E56C1D49}" type="datetimeFigureOut">
               <a:rPr lang="en-US" smtClean="0"/>
-              <a:t>3/19/2019</a:t>
+              <a:t>22-Mar-19</a:t>
             </a:fld>
             <a:endParaRPr lang="en-US"/>
           </a:p>
@@ -1252,7 +1252,7 @@
           <a:p>
             <a:fld id="{78C97017-6FC3-485B-9764-EAC9E56C1D49}" type="datetimeFigureOut">
               <a:rPr lang="en-US" smtClean="0"/>
-              <a:t>3/19/2019</a:t>
+              <a:t>22-Mar-19</a:t>
             </a:fld>
             <a:endParaRPr lang="en-US"/>
           </a:p>
@@ -1497,7 +1497,7 @@
           <a:p>
             <a:fld id="{78C97017-6FC3-485B-9764-EAC9E56C1D49}" type="datetimeFigureOut">
               <a:rPr lang="en-US" smtClean="0"/>
-              <a:t>3/19/2019</a:t>
+              <a:t>22-Mar-19</a:t>
             </a:fld>
             <a:endParaRPr lang="en-US"/>
           </a:p>
@@ -1782,7 +1782,7 @@
           <a:p>
             <a:fld id="{78C97017-6FC3-485B-9764-EAC9E56C1D49}" type="datetimeFigureOut">
               <a:rPr lang="en-US" smtClean="0"/>
-              <a:t>3/19/2019</a:t>
+              <a:t>22-Mar-19</a:t>
             </a:fld>
             <a:endParaRPr lang="en-US"/>
           </a:p>
@@ -2201,7 +2201,7 @@
           <a:p>
             <a:fld id="{78C97017-6FC3-485B-9764-EAC9E56C1D49}" type="datetimeFigureOut">
               <a:rPr lang="en-US" smtClean="0"/>
-              <a:t>3/19/2019</a:t>
+              <a:t>22-Mar-19</a:t>
             </a:fld>
             <a:endParaRPr lang="en-US"/>
           </a:p>
@@ -2318,7 +2318,7 @@
           <a:p>
             <a:fld id="{78C97017-6FC3-485B-9764-EAC9E56C1D49}" type="datetimeFigureOut">
               <a:rPr lang="en-US" smtClean="0"/>
-              <a:t>3/19/2019</a:t>
+              <a:t>22-Mar-19</a:t>
             </a:fld>
             <a:endParaRPr lang="en-US"/>
           </a:p>
@@ -2413,7 +2413,7 @@
           <a:p>
             <a:fld id="{78C97017-6FC3-485B-9764-EAC9E56C1D49}" type="datetimeFigureOut">
               <a:rPr lang="en-US" smtClean="0"/>
-              <a:t>3/19/2019</a:t>
+              <a:t>22-Mar-19</a:t>
             </a:fld>
             <a:endParaRPr lang="en-US"/>
           </a:p>
@@ -2688,7 +2688,7 @@
           <a:p>
             <a:fld id="{78C97017-6FC3-485B-9764-EAC9E56C1D49}" type="datetimeFigureOut">
               <a:rPr lang="en-US" smtClean="0"/>
-              <a:t>3/19/2019</a:t>
+              <a:t>22-Mar-19</a:t>
             </a:fld>
             <a:endParaRPr lang="en-US"/>
           </a:p>
@@ -2940,7 +2940,7 @@
           <a:p>
             <a:fld id="{78C97017-6FC3-485B-9764-EAC9E56C1D49}" type="datetimeFigureOut">
               <a:rPr lang="en-US" smtClean="0"/>
-              <a:t>3/19/2019</a:t>
+              <a:t>22-Mar-19</a:t>
             </a:fld>
             <a:endParaRPr lang="en-US"/>
           </a:p>
@@ -3151,7 +3151,7 @@
           <a:p>
             <a:fld id="{78C97017-6FC3-485B-9764-EAC9E56C1D49}" type="datetimeFigureOut">
               <a:rPr lang="en-US" smtClean="0"/>
-              <a:t>3/19/2019</a:t>
+              <a:t>22-Mar-19</a:t>
             </a:fld>
             <a:endParaRPr lang="en-US"/>
           </a:p>
@@ -3848,7 +3848,7 @@
         <p:spPr>
           <a:xfrm>
             <a:off x="402306" y="996604"/>
-            <a:ext cx="1219200" cy="467684"/>
+            <a:ext cx="1278066" cy="467684"/>
           </a:xfrm>
           <a:prstGeom prst="rect">
             <a:avLst/>
@@ -3888,18 +3888,15 @@
                   <a:schemeClr val="bg1"/>
                 </a:solidFill>
               </a:rPr>
-              <a:t>:Address</a:t>
-            </a:r>
-          </a:p>
-          <a:p>
-            <a:pPr algn="ctr"/>
+              <a:t>:</a:t>
+            </a:r>
             <a:r>
               <a:rPr lang="en-US" sz="1600" dirty="0" err="1">
                 <a:solidFill>
                   <a:schemeClr val="bg1"/>
                 </a:solidFill>
               </a:rPr>
-              <a:t>BookParser</a:t>
+              <a:t>TravelBuddyParser</a:t>
             </a:r>
             <a:endParaRPr lang="en-SG" sz="1600" dirty="0">
               <a:solidFill>
@@ -5239,15 +5236,7 @@
                   <a:schemeClr val="bg1"/>
                 </a:solidFill>
               </a:rPr>
-              <a:t>: </a:t>
-            </a:r>
-            <a:r>
-              <a:rPr lang="en-US" sz="1600" dirty="0" err="1">
-                <a:solidFill>
-                  <a:schemeClr val="bg1"/>
-                </a:solidFill>
-              </a:rPr>
-              <a:t>AddressBook</a:t>
+              <a:t>: TravelBuddy</a:t>
             </a:r>
             <a:endParaRPr lang="en-SG" sz="1600" dirty="0">
               <a:solidFill>
@@ -6027,7 +6016,7 @@
           <a:p>
             <a:r>
               <a:rPr lang="en-US" sz="1200" dirty="0" err="1"/>
-              <a:t>commitAddressBook</a:t>
+              <a:t>commitTravelBuddy</a:t>
             </a:r>
             <a:r>
               <a:rPr lang="en-US" sz="1200" dirty="0"/>

</xml_diff>

<commit_message>
Update UG & DG and re-alignment of PlaceCard
Update all the images in UG & DG to match the present UI, included date visited portion, update diagrams related to date visited portion. 

Fix the alignment of PlaceCard entries in the UI.

Enable Date Visited to edited solely.
</commit_message>
<xml_diff>
--- a/docs/diagrams/Command_Add_SequenceDiagram.pptx
+++ b/docs/diagrams/Command_Add_SequenceDiagram.pptx
@@ -208,7 +208,7 @@
           <a:p>
             <a:fld id="{F5CC4B3F-88C1-4FFA-B1B6-F41C21DC6924}" type="datetimeFigureOut">
               <a:rPr lang="en-US" smtClean="0"/>
-              <a:t>22-Mar-19</a:t>
+              <a:t>3/26/2019</a:t>
             </a:fld>
             <a:endParaRPr lang="en-US"/>
           </a:p>
@@ -738,7 +738,7 @@
           <a:p>
             <a:fld id="{78C97017-6FC3-485B-9764-EAC9E56C1D49}" type="datetimeFigureOut">
               <a:rPr lang="en-US" smtClean="0"/>
-              <a:t>22-Mar-19</a:t>
+              <a:t>3/26/2019</a:t>
             </a:fld>
             <a:endParaRPr lang="en-US"/>
           </a:p>
@@ -906,7 +906,7 @@
           <a:p>
             <a:fld id="{78C97017-6FC3-485B-9764-EAC9E56C1D49}" type="datetimeFigureOut">
               <a:rPr lang="en-US" smtClean="0"/>
-              <a:t>22-Mar-19</a:t>
+              <a:t>3/26/2019</a:t>
             </a:fld>
             <a:endParaRPr lang="en-US"/>
           </a:p>
@@ -1084,7 +1084,7 @@
           <a:p>
             <a:fld id="{78C97017-6FC3-485B-9764-EAC9E56C1D49}" type="datetimeFigureOut">
               <a:rPr lang="en-US" smtClean="0"/>
-              <a:t>22-Mar-19</a:t>
+              <a:t>3/26/2019</a:t>
             </a:fld>
             <a:endParaRPr lang="en-US"/>
           </a:p>
@@ -1252,7 +1252,7 @@
           <a:p>
             <a:fld id="{78C97017-6FC3-485B-9764-EAC9E56C1D49}" type="datetimeFigureOut">
               <a:rPr lang="en-US" smtClean="0"/>
-              <a:t>22-Mar-19</a:t>
+              <a:t>3/26/2019</a:t>
             </a:fld>
             <a:endParaRPr lang="en-US"/>
           </a:p>
@@ -1497,7 +1497,7 @@
           <a:p>
             <a:fld id="{78C97017-6FC3-485B-9764-EAC9E56C1D49}" type="datetimeFigureOut">
               <a:rPr lang="en-US" smtClean="0"/>
-              <a:t>22-Mar-19</a:t>
+              <a:t>3/26/2019</a:t>
             </a:fld>
             <a:endParaRPr lang="en-US"/>
           </a:p>
@@ -1782,7 +1782,7 @@
           <a:p>
             <a:fld id="{78C97017-6FC3-485B-9764-EAC9E56C1D49}" type="datetimeFigureOut">
               <a:rPr lang="en-US" smtClean="0"/>
-              <a:t>22-Mar-19</a:t>
+              <a:t>3/26/2019</a:t>
             </a:fld>
             <a:endParaRPr lang="en-US"/>
           </a:p>
@@ -2201,7 +2201,7 @@
           <a:p>
             <a:fld id="{78C97017-6FC3-485B-9764-EAC9E56C1D49}" type="datetimeFigureOut">
               <a:rPr lang="en-US" smtClean="0"/>
-              <a:t>22-Mar-19</a:t>
+              <a:t>3/26/2019</a:t>
             </a:fld>
             <a:endParaRPr lang="en-US"/>
           </a:p>
@@ -2318,7 +2318,7 @@
           <a:p>
             <a:fld id="{78C97017-6FC3-485B-9764-EAC9E56C1D49}" type="datetimeFigureOut">
               <a:rPr lang="en-US" smtClean="0"/>
-              <a:t>22-Mar-19</a:t>
+              <a:t>3/26/2019</a:t>
             </a:fld>
             <a:endParaRPr lang="en-US"/>
           </a:p>
@@ -2413,7 +2413,7 @@
           <a:p>
             <a:fld id="{78C97017-6FC3-485B-9764-EAC9E56C1D49}" type="datetimeFigureOut">
               <a:rPr lang="en-US" smtClean="0"/>
-              <a:t>22-Mar-19</a:t>
+              <a:t>3/26/2019</a:t>
             </a:fld>
             <a:endParaRPr lang="en-US"/>
           </a:p>
@@ -2688,7 +2688,7 @@
           <a:p>
             <a:fld id="{78C97017-6FC3-485B-9764-EAC9E56C1D49}" type="datetimeFigureOut">
               <a:rPr lang="en-US" smtClean="0"/>
-              <a:t>22-Mar-19</a:t>
+              <a:t>3/26/2019</a:t>
             </a:fld>
             <a:endParaRPr lang="en-US"/>
           </a:p>
@@ -2940,7 +2940,7 @@
           <a:p>
             <a:fld id="{78C97017-6FC3-485B-9764-EAC9E56C1D49}" type="datetimeFigureOut">
               <a:rPr lang="en-US" smtClean="0"/>
-              <a:t>22-Mar-19</a:t>
+              <a:t>3/26/2019</a:t>
             </a:fld>
             <a:endParaRPr lang="en-US"/>
           </a:p>
@@ -3151,7 +3151,7 @@
           <a:p>
             <a:fld id="{78C97017-6FC3-485B-9764-EAC9E56C1D49}" type="datetimeFigureOut">
               <a:rPr lang="en-US" smtClean="0"/>
-              <a:t>22-Mar-19</a:t>
+              <a:t>3/26/2019</a:t>
             </a:fld>
             <a:endParaRPr lang="en-US"/>
           </a:p>
@@ -3888,15 +3888,7 @@
                   <a:schemeClr val="bg1"/>
                 </a:solidFill>
               </a:rPr>
-              <a:t>:</a:t>
-            </a:r>
-            <a:r>
-              <a:rPr lang="en-US" sz="1600" dirty="0" err="1">
-                <a:solidFill>
-                  <a:schemeClr val="bg1"/>
-                </a:solidFill>
-              </a:rPr>
-              <a:t>TravelBuddyParser</a:t>
+              <a:t>:TravelBuddyParser</a:t>
             </a:r>
             <a:endParaRPr lang="en-SG" sz="1600" dirty="0">
               <a:solidFill>
@@ -4144,7 +4136,7 @@
                   <a:srgbClr val="0070C0"/>
                 </a:solidFill>
               </a:rPr>
-              <a:t>execute(“add n/NUS Computing cc/SGP r/3 d/My School a/13 Computing Drive, 117417 t/faculty")</a:t>
+              <a:t>execute(“add n/NUS Computing cc/SGP dv/10/10/2017 r/3 d/My School a/13 Computing Drive, 117417 t/faculty")</a:t>
             </a:r>
           </a:p>
         </p:txBody>
@@ -4379,12 +4371,8 @@
           </a:lstStyle>
           <a:p>
             <a:r>
-              <a:rPr lang="en-US" dirty="0" err="1"/>
-              <a:t>parseCommand</a:t>
-            </a:r>
-            <a:r>
               <a:rPr lang="en-US" dirty="0"/>
-              <a:t>(“add …””)</a:t>
+              <a:t>parseCommand(“add …””)</a:t>
             </a:r>
           </a:p>
         </p:txBody>
@@ -4653,7 +4641,7 @@
           <a:p>
             <a:pPr algn="ctr"/>
             <a:r>
-              <a:rPr lang="en-US" sz="1600" dirty="0" err="1">
+              <a:rPr lang="en-US" sz="1600" dirty="0">
                 <a:solidFill>
                   <a:schemeClr val="bg1"/>
                 </a:solidFill>
@@ -4842,12 +4830,8 @@
           </a:lstStyle>
           <a:p>
             <a:r>
-              <a:rPr lang="en-US" dirty="0" err="1"/>
-              <a:t>AddCommandParser</a:t>
-            </a:r>
-            <a:r>
               <a:rPr lang="en-US" dirty="0"/>
-              <a:t>()</a:t>
+              <a:t>AddCommandParser()</a:t>
             </a:r>
           </a:p>
         </p:txBody>
@@ -4907,15 +4891,7 @@
                   <a:schemeClr val="bg1"/>
                 </a:solidFill>
               </a:rPr>
-              <a:t>:</a:t>
-            </a:r>
-            <a:r>
-              <a:rPr lang="en-US" sz="1600" dirty="0" err="1">
-                <a:solidFill>
-                  <a:schemeClr val="bg1"/>
-                </a:solidFill>
-              </a:rPr>
-              <a:t>AddCommand</a:t>
+              <a:t>:AddCommand</a:t>
             </a:r>
             <a:endParaRPr lang="en-SG" sz="1600" dirty="0">
               <a:solidFill>
@@ -5064,20 +5040,8 @@
           </a:lstStyle>
           <a:p>
             <a:r>
-              <a:rPr lang="en-US" sz="1200" dirty="0" err="1"/>
-              <a:t>addPlace</a:t>
-            </a:r>
-            <a:r>
               <a:rPr lang="en-US" sz="1200" dirty="0"/>
-              <a:t>(</a:t>
-            </a:r>
-            <a:r>
-              <a:rPr lang="en-US" sz="1200" dirty="0" err="1"/>
-              <a:t>toAdd</a:t>
-            </a:r>
-            <a:r>
-              <a:rPr lang="en-US" sz="1200" dirty="0"/>
-              <a:t>)</a:t>
+              <a:t>addPlace(toAdd)</a:t>
             </a:r>
           </a:p>
         </p:txBody>
@@ -5428,36 +5392,12 @@
           </a:lstStyle>
           <a:p>
             <a:r>
-              <a:rPr lang="en-US" sz="1200" dirty="0" err="1">
-                <a:solidFill>
-                  <a:srgbClr val="7030A0"/>
-                </a:solidFill>
-              </a:rPr>
-              <a:t>addPlace</a:t>
-            </a:r>
-            <a:r>
               <a:rPr lang="en-US" sz="1200" dirty="0">
                 <a:solidFill>
                   <a:srgbClr val="7030A0"/>
                 </a:solidFill>
               </a:rPr>
-              <a:t>(</a:t>
-            </a:r>
-            <a:r>
-              <a:rPr lang="en-US" sz="1200" dirty="0" err="1">
-                <a:solidFill>
-                  <a:srgbClr val="7030A0"/>
-                </a:solidFill>
-              </a:rPr>
-              <a:t>toAdd</a:t>
-            </a:r>
-            <a:r>
-              <a:rPr lang="en-US" sz="1200" dirty="0">
-                <a:solidFill>
-                  <a:srgbClr val="7030A0"/>
-                </a:solidFill>
-              </a:rPr>
-              <a:t>)</a:t>
+              <a:t>addPlace(toAdd)</a:t>
             </a:r>
             <a:endParaRPr lang="en-US" sz="1200" dirty="0"/>
           </a:p>
@@ -5875,12 +5815,8 @@
           </a:lstStyle>
           <a:p>
             <a:r>
-              <a:rPr lang="en-US" sz="1200" dirty="0" err="1"/>
-              <a:t>AddCommand</a:t>
-            </a:r>
-            <a:r>
               <a:rPr lang="en-US" sz="1200" dirty="0"/>
-              <a:t>(place)</a:t>
+              <a:t>AddCommand(place)</a:t>
             </a:r>
           </a:p>
         </p:txBody>
@@ -6015,12 +5951,8 @@
           </a:lstStyle>
           <a:p>
             <a:r>
-              <a:rPr lang="en-US" sz="1200" dirty="0" err="1"/>
-              <a:t>commitTravelBuddy</a:t>
-            </a:r>
-            <a:r>
               <a:rPr lang="en-US" sz="1200" dirty="0"/>
-              <a:t>()</a:t>
+              <a:t>commitTravelBuddy()</a:t>
             </a:r>
           </a:p>
         </p:txBody>

</xml_diff>

<commit_message>
Update DG to CS2101 & CS2103T standard
Updated DG Section 3.3 to 3.3.2  and Section 5.0 to 6.0. Removed Appendix A as it is not relavent.
</commit_message>
<xml_diff>
--- a/docs/diagrams/Command_Add_SequenceDiagram.pptx
+++ b/docs/diagrams/Command_Add_SequenceDiagram.pptx
@@ -208,7 +208,7 @@
           <a:p>
             <a:fld id="{F5CC4B3F-88C1-4FFA-B1B6-F41C21DC6924}" type="datetimeFigureOut">
               <a:rPr lang="en-US" smtClean="0"/>
-              <a:t>3/26/2019</a:t>
+              <a:t>3/31/2019</a:t>
             </a:fld>
             <a:endParaRPr lang="en-US"/>
           </a:p>
@@ -738,7 +738,7 @@
           <a:p>
             <a:fld id="{78C97017-6FC3-485B-9764-EAC9E56C1D49}" type="datetimeFigureOut">
               <a:rPr lang="en-US" smtClean="0"/>
-              <a:t>3/26/2019</a:t>
+              <a:t>3/31/2019</a:t>
             </a:fld>
             <a:endParaRPr lang="en-US"/>
           </a:p>
@@ -906,7 +906,7 @@
           <a:p>
             <a:fld id="{78C97017-6FC3-485B-9764-EAC9E56C1D49}" type="datetimeFigureOut">
               <a:rPr lang="en-US" smtClean="0"/>
-              <a:t>3/26/2019</a:t>
+              <a:t>3/31/2019</a:t>
             </a:fld>
             <a:endParaRPr lang="en-US"/>
           </a:p>
@@ -1084,7 +1084,7 @@
           <a:p>
             <a:fld id="{78C97017-6FC3-485B-9764-EAC9E56C1D49}" type="datetimeFigureOut">
               <a:rPr lang="en-US" smtClean="0"/>
-              <a:t>3/26/2019</a:t>
+              <a:t>3/31/2019</a:t>
             </a:fld>
             <a:endParaRPr lang="en-US"/>
           </a:p>
@@ -1252,7 +1252,7 @@
           <a:p>
             <a:fld id="{78C97017-6FC3-485B-9764-EAC9E56C1D49}" type="datetimeFigureOut">
               <a:rPr lang="en-US" smtClean="0"/>
-              <a:t>3/26/2019</a:t>
+              <a:t>3/31/2019</a:t>
             </a:fld>
             <a:endParaRPr lang="en-US"/>
           </a:p>
@@ -1497,7 +1497,7 @@
           <a:p>
             <a:fld id="{78C97017-6FC3-485B-9764-EAC9E56C1D49}" type="datetimeFigureOut">
               <a:rPr lang="en-US" smtClean="0"/>
-              <a:t>3/26/2019</a:t>
+              <a:t>3/31/2019</a:t>
             </a:fld>
             <a:endParaRPr lang="en-US"/>
           </a:p>
@@ -1782,7 +1782,7 @@
           <a:p>
             <a:fld id="{78C97017-6FC3-485B-9764-EAC9E56C1D49}" type="datetimeFigureOut">
               <a:rPr lang="en-US" smtClean="0"/>
-              <a:t>3/26/2019</a:t>
+              <a:t>3/31/2019</a:t>
             </a:fld>
             <a:endParaRPr lang="en-US"/>
           </a:p>
@@ -2201,7 +2201,7 @@
           <a:p>
             <a:fld id="{78C97017-6FC3-485B-9764-EAC9E56C1D49}" type="datetimeFigureOut">
               <a:rPr lang="en-US" smtClean="0"/>
-              <a:t>3/26/2019</a:t>
+              <a:t>3/31/2019</a:t>
             </a:fld>
             <a:endParaRPr lang="en-US"/>
           </a:p>
@@ -2318,7 +2318,7 @@
           <a:p>
             <a:fld id="{78C97017-6FC3-485B-9764-EAC9E56C1D49}" type="datetimeFigureOut">
               <a:rPr lang="en-US" smtClean="0"/>
-              <a:t>3/26/2019</a:t>
+              <a:t>3/31/2019</a:t>
             </a:fld>
             <a:endParaRPr lang="en-US"/>
           </a:p>
@@ -2413,7 +2413,7 @@
           <a:p>
             <a:fld id="{78C97017-6FC3-485B-9764-EAC9E56C1D49}" type="datetimeFigureOut">
               <a:rPr lang="en-US" smtClean="0"/>
-              <a:t>3/26/2019</a:t>
+              <a:t>3/31/2019</a:t>
             </a:fld>
             <a:endParaRPr lang="en-US"/>
           </a:p>
@@ -2688,7 +2688,7 @@
           <a:p>
             <a:fld id="{78C97017-6FC3-485B-9764-EAC9E56C1D49}" type="datetimeFigureOut">
               <a:rPr lang="en-US" smtClean="0"/>
-              <a:t>3/26/2019</a:t>
+              <a:t>3/31/2019</a:t>
             </a:fld>
             <a:endParaRPr lang="en-US"/>
           </a:p>
@@ -2940,7 +2940,7 @@
           <a:p>
             <a:fld id="{78C97017-6FC3-485B-9764-EAC9E56C1D49}" type="datetimeFigureOut">
               <a:rPr lang="en-US" smtClean="0"/>
-              <a:t>3/26/2019</a:t>
+              <a:t>3/31/2019</a:t>
             </a:fld>
             <a:endParaRPr lang="en-US"/>
           </a:p>
@@ -3151,7 +3151,7 @@
           <a:p>
             <a:fld id="{78C97017-6FC3-485B-9764-EAC9E56C1D49}" type="datetimeFigureOut">
               <a:rPr lang="en-US" smtClean="0"/>
-              <a:t>3/26/2019</a:t>
+              <a:t>3/31/2019</a:t>
             </a:fld>
             <a:endParaRPr lang="en-US"/>
           </a:p>
@@ -4372,7 +4372,7 @@
           <a:p>
             <a:r>
               <a:rPr lang="en-US" dirty="0"/>
-              <a:t>parseCommand(“add …””)</a:t>
+              <a:t>parseCommand(“add …”)</a:t>
             </a:r>
           </a:p>
         </p:txBody>
@@ -4466,7 +4466,7 @@
                   <a:schemeClr val="bg1"/>
                 </a:solidFill>
               </a:rPr>
-              <a:t>: Model</a:t>
+              <a:t>:Model</a:t>
             </a:r>
             <a:endParaRPr lang="en-SG" sz="1600" dirty="0">
               <a:solidFill>
@@ -4524,9 +4524,9 @@
           <p:nvPr/>
         </p:nvCxnSpPr>
         <p:spPr>
-          <a:xfrm flipV="1">
-            <a:off x="1153379" y="2604807"/>
-            <a:ext cx="2704661" cy="14528"/>
+          <a:xfrm>
+            <a:off x="1137561" y="2604807"/>
+            <a:ext cx="2720479" cy="0"/>
           </a:xfrm>
           <a:prstGeom prst="straightConnector1">
             <a:avLst/>
@@ -4716,8 +4716,8 @@
         </p:nvCxnSpPr>
         <p:spPr>
           <a:xfrm>
-            <a:off x="-1326635" y="1904999"/>
-            <a:ext cx="2256705" cy="1"/>
+            <a:off x="-1336515" y="1905000"/>
+            <a:ext cx="2266585" cy="0"/>
           </a:xfrm>
           <a:prstGeom prst="straightConnector1">
             <a:avLst/>
@@ -4760,8 +4760,8 @@
         </p:nvCxnSpPr>
         <p:spPr>
           <a:xfrm>
-            <a:off x="-1332146" y="4754536"/>
-            <a:ext cx="7803578" cy="46390"/>
+            <a:off x="-1313405" y="4800926"/>
+            <a:ext cx="7784837" cy="0"/>
           </a:xfrm>
           <a:prstGeom prst="straightConnector1">
             <a:avLst/>
@@ -4915,7 +4915,7 @@
         </p:nvSpPr>
         <p:spPr>
           <a:xfrm>
-            <a:off x="995815" y="2313664"/>
+            <a:off x="1752600" y="2394994"/>
             <a:ext cx="1756536" cy="215444"/>
           </a:xfrm>
           <a:prstGeom prst="rect">
@@ -5115,8 +5115,8 @@
         </p:nvCxnSpPr>
         <p:spPr>
           <a:xfrm>
-            <a:off x="6631710" y="4171205"/>
-            <a:ext cx="1700859" cy="19795"/>
+            <a:off x="6628564" y="4191000"/>
+            <a:ext cx="1704005" cy="0"/>
           </a:xfrm>
           <a:prstGeom prst="straightConnector1">
             <a:avLst/>
@@ -5200,7 +5200,7 @@
                   <a:schemeClr val="bg1"/>
                 </a:solidFill>
               </a:rPr>
-              <a:t>: TravelBuddy</a:t>
+              <a:t>:TravelBuddy</a:t>
             </a:r>
             <a:endParaRPr lang="en-SG" sz="1600" dirty="0">
               <a:solidFill>
@@ -5325,7 +5325,7 @@
         <p:spPr>
           <a:xfrm>
             <a:off x="8439103" y="4231582"/>
-            <a:ext cx="1455168" cy="3062"/>
+            <a:ext cx="1455168" cy="0"/>
           </a:xfrm>
           <a:prstGeom prst="straightConnector1">
             <a:avLst/>
@@ -5505,8 +5505,8 @@
         </p:nvCxnSpPr>
         <p:spPr>
           <a:xfrm>
-            <a:off x="3957191" y="2725134"/>
-            <a:ext cx="1704781" cy="13757"/>
+            <a:off x="3931920" y="2733040"/>
+            <a:ext cx="1730052" cy="5851"/>
           </a:xfrm>
           <a:prstGeom prst="straightConnector1">
             <a:avLst/>
@@ -5691,9 +5691,9 @@
           <p:nvPr/>
         </p:nvCxnSpPr>
         <p:spPr>
-          <a:xfrm>
-            <a:off x="1137561" y="2286949"/>
-            <a:ext cx="2635463" cy="8755"/>
+          <a:xfrm flipV="1">
+            <a:off x="1137561" y="2295704"/>
+            <a:ext cx="2635463" cy="3764"/>
           </a:xfrm>
           <a:prstGeom prst="straightConnector1">
             <a:avLst/>
@@ -5789,8 +5789,8 @@
         </p:nvSpPr>
         <p:spPr>
           <a:xfrm>
-            <a:off x="3537822" y="2501974"/>
-            <a:ext cx="2024778" cy="184666"/>
+            <a:off x="3538043" y="2461997"/>
+            <a:ext cx="2024778" cy="215444"/>
           </a:xfrm>
           <a:prstGeom prst="rect">
             <a:avLst/>
@@ -5815,7 +5815,7 @@
           </a:lstStyle>
           <a:p>
             <a:r>
-              <a:rPr lang="en-US" sz="1200" dirty="0"/>
+              <a:rPr lang="en-US" dirty="0"/>
               <a:t>AddCommand(place)</a:t>
             </a:r>
           </a:p>
@@ -5837,8 +5837,8 @@
         </p:nvCxnSpPr>
         <p:spPr>
           <a:xfrm>
-            <a:off x="6687400" y="4495800"/>
-            <a:ext cx="1615169" cy="0"/>
+            <a:off x="6629400" y="4495800"/>
+            <a:ext cx="1625033" cy="0"/>
           </a:xfrm>
           <a:prstGeom prst="straightConnector1">
             <a:avLst/>
@@ -5881,8 +5881,8 @@
         </p:nvCxnSpPr>
         <p:spPr>
           <a:xfrm>
-            <a:off x="6628741" y="4676008"/>
-            <a:ext cx="1700859" cy="19795"/>
+            <a:off x="6628564" y="4695803"/>
+            <a:ext cx="1701036" cy="0"/>
           </a:xfrm>
           <a:prstGeom prst="straightConnector1">
             <a:avLst/>

</xml_diff>

<commit_message>
Fix broken image links in DG
Add AddCommandStep1.png
Rename AddCommandSequenceDiagram.png to AddCommandSequenceDiagram.PNG
</commit_message>
<xml_diff>
--- a/docs/diagrams/Command_Add_SequenceDiagram.pptx
+++ b/docs/diagrams/Command_Add_SequenceDiagram.pptx
@@ -208,7 +208,7 @@
           <a:p>
             <a:fld id="{F5CC4B3F-88C1-4FFA-B1B6-F41C21DC6924}" type="datetimeFigureOut">
               <a:rPr lang="en-US" smtClean="0"/>
-              <a:t>3/31/2019</a:t>
+              <a:t>4/1/2019</a:t>
             </a:fld>
             <a:endParaRPr lang="en-US"/>
           </a:p>
@@ -738,7 +738,7 @@
           <a:p>
             <a:fld id="{78C97017-6FC3-485B-9764-EAC9E56C1D49}" type="datetimeFigureOut">
               <a:rPr lang="en-US" smtClean="0"/>
-              <a:t>3/31/2019</a:t>
+              <a:t>4/1/2019</a:t>
             </a:fld>
             <a:endParaRPr lang="en-US"/>
           </a:p>
@@ -906,7 +906,7 @@
           <a:p>
             <a:fld id="{78C97017-6FC3-485B-9764-EAC9E56C1D49}" type="datetimeFigureOut">
               <a:rPr lang="en-US" smtClean="0"/>
-              <a:t>3/31/2019</a:t>
+              <a:t>4/1/2019</a:t>
             </a:fld>
             <a:endParaRPr lang="en-US"/>
           </a:p>
@@ -1084,7 +1084,7 @@
           <a:p>
             <a:fld id="{78C97017-6FC3-485B-9764-EAC9E56C1D49}" type="datetimeFigureOut">
               <a:rPr lang="en-US" smtClean="0"/>
-              <a:t>3/31/2019</a:t>
+              <a:t>4/1/2019</a:t>
             </a:fld>
             <a:endParaRPr lang="en-US"/>
           </a:p>
@@ -1252,7 +1252,7 @@
           <a:p>
             <a:fld id="{78C97017-6FC3-485B-9764-EAC9E56C1D49}" type="datetimeFigureOut">
               <a:rPr lang="en-US" smtClean="0"/>
-              <a:t>3/31/2019</a:t>
+              <a:t>4/1/2019</a:t>
             </a:fld>
             <a:endParaRPr lang="en-US"/>
           </a:p>
@@ -1497,7 +1497,7 @@
           <a:p>
             <a:fld id="{78C97017-6FC3-485B-9764-EAC9E56C1D49}" type="datetimeFigureOut">
               <a:rPr lang="en-US" smtClean="0"/>
-              <a:t>3/31/2019</a:t>
+              <a:t>4/1/2019</a:t>
             </a:fld>
             <a:endParaRPr lang="en-US"/>
           </a:p>
@@ -1782,7 +1782,7 @@
           <a:p>
             <a:fld id="{78C97017-6FC3-485B-9764-EAC9E56C1D49}" type="datetimeFigureOut">
               <a:rPr lang="en-US" smtClean="0"/>
-              <a:t>3/31/2019</a:t>
+              <a:t>4/1/2019</a:t>
             </a:fld>
             <a:endParaRPr lang="en-US"/>
           </a:p>
@@ -2201,7 +2201,7 @@
           <a:p>
             <a:fld id="{78C97017-6FC3-485B-9764-EAC9E56C1D49}" type="datetimeFigureOut">
               <a:rPr lang="en-US" smtClean="0"/>
-              <a:t>3/31/2019</a:t>
+              <a:t>4/1/2019</a:t>
             </a:fld>
             <a:endParaRPr lang="en-US"/>
           </a:p>
@@ -2318,7 +2318,7 @@
           <a:p>
             <a:fld id="{78C97017-6FC3-485B-9764-EAC9E56C1D49}" type="datetimeFigureOut">
               <a:rPr lang="en-US" smtClean="0"/>
-              <a:t>3/31/2019</a:t>
+              <a:t>4/1/2019</a:t>
             </a:fld>
             <a:endParaRPr lang="en-US"/>
           </a:p>
@@ -2413,7 +2413,7 @@
           <a:p>
             <a:fld id="{78C97017-6FC3-485B-9764-EAC9E56C1D49}" type="datetimeFigureOut">
               <a:rPr lang="en-US" smtClean="0"/>
-              <a:t>3/31/2019</a:t>
+              <a:t>4/1/2019</a:t>
             </a:fld>
             <a:endParaRPr lang="en-US"/>
           </a:p>
@@ -2688,7 +2688,7 @@
           <a:p>
             <a:fld id="{78C97017-6FC3-485B-9764-EAC9E56C1D49}" type="datetimeFigureOut">
               <a:rPr lang="en-US" smtClean="0"/>
-              <a:t>3/31/2019</a:t>
+              <a:t>4/1/2019</a:t>
             </a:fld>
             <a:endParaRPr lang="en-US"/>
           </a:p>
@@ -2940,7 +2940,7 @@
           <a:p>
             <a:fld id="{78C97017-6FC3-485B-9764-EAC9E56C1D49}" type="datetimeFigureOut">
               <a:rPr lang="en-US" smtClean="0"/>
-              <a:t>3/31/2019</a:t>
+              <a:t>4/1/2019</a:t>
             </a:fld>
             <a:endParaRPr lang="en-US"/>
           </a:p>
@@ -3151,7 +3151,7 @@
           <a:p>
             <a:fld id="{78C97017-6FC3-485B-9764-EAC9E56C1D49}" type="datetimeFigureOut">
               <a:rPr lang="en-US" smtClean="0"/>
-              <a:t>3/31/2019</a:t>
+              <a:t>4/1/2019</a:t>
             </a:fld>
             <a:endParaRPr lang="en-US"/>
           </a:p>
@@ -3512,6 +3512,14 @@
 <file path=ppt/slides/slide1.xml><?xml version="1.0" encoding="utf-8"?>
 <p:sld xmlns:a="http://schemas.openxmlformats.org/drawingml/2006/main" xmlns:r="http://schemas.openxmlformats.org/officeDocument/2006/relationships" xmlns:p="http://schemas.openxmlformats.org/presentationml/2006/main">
   <p:cSld>
+    <p:bg>
+      <p:bgPr>
+        <a:solidFill>
+          <a:schemeClr val="bg1"/>
+        </a:solidFill>
+        <a:effectLst/>
+      </p:bgPr>
+    </p:bg>
     <p:spTree>
       <p:nvGrpSpPr>
         <p:cNvPr id="1" name=""/>

</xml_diff>

<commit_message>
Update UserGuide, DeveloperGuide & PPP.
</commit_message>
<xml_diff>
--- a/docs/diagrams/Command_Add_SequenceDiagram.pptx
+++ b/docs/diagrams/Command_Add_SequenceDiagram.pptx
@@ -208,7 +208,7 @@
           <a:p>
             <a:fld id="{F5CC4B3F-88C1-4FFA-B1B6-F41C21DC6924}" type="datetimeFigureOut">
               <a:rPr lang="en-US" smtClean="0"/>
-              <a:t>4/1/2019</a:t>
+              <a:t>4/14/2019</a:t>
             </a:fld>
             <a:endParaRPr lang="en-US"/>
           </a:p>
@@ -502,7 +502,12 @@
             <p:ph type="sldImg"/>
           </p:nvPr>
         </p:nvSpPr>
-        <p:spPr/>
+        <p:spPr>
+          <a:xfrm>
+            <a:off x="1143000" y="685800"/>
+            <a:ext cx="4572000" cy="3429000"/>
+          </a:xfrm>
+        </p:spPr>
       </p:sp>
       <p:sp>
         <p:nvSpPr>
@@ -588,7 +593,7 @@
         </p:nvSpPr>
         <p:spPr>
           <a:xfrm>
-            <a:off x="685800" y="2130427"/>
+            <a:off x="685800" y="2130429"/>
             <a:ext cx="7772400" cy="1470025"/>
           </a:xfrm>
         </p:spPr>
@@ -738,7 +743,7 @@
           <a:p>
             <a:fld id="{78C97017-6FC3-485B-9764-EAC9E56C1D49}" type="datetimeFigureOut">
               <a:rPr lang="en-US" smtClean="0"/>
-              <a:t>4/1/2019</a:t>
+              <a:t>4/14/2019</a:t>
             </a:fld>
             <a:endParaRPr lang="en-US"/>
           </a:p>
@@ -906,7 +911,7 @@
           <a:p>
             <a:fld id="{78C97017-6FC3-485B-9764-EAC9E56C1D49}" type="datetimeFigureOut">
               <a:rPr lang="en-US" smtClean="0"/>
-              <a:t>4/1/2019</a:t>
+              <a:t>4/14/2019</a:t>
             </a:fld>
             <a:endParaRPr lang="en-US"/>
           </a:p>
@@ -996,7 +1001,7 @@
         </p:nvSpPr>
         <p:spPr>
           <a:xfrm>
-            <a:off x="6629400" y="274640"/>
+            <a:off x="6629400" y="274642"/>
             <a:ext cx="2057400" cy="5851525"/>
           </a:xfrm>
         </p:spPr>
@@ -1023,7 +1028,7 @@
         </p:nvSpPr>
         <p:spPr>
           <a:xfrm>
-            <a:off x="457200" y="274640"/>
+            <a:off x="457200" y="274642"/>
             <a:ext cx="6019800" cy="5851525"/>
           </a:xfrm>
         </p:spPr>
@@ -1084,7 +1089,7 @@
           <a:p>
             <a:fld id="{78C97017-6FC3-485B-9764-EAC9E56C1D49}" type="datetimeFigureOut">
               <a:rPr lang="en-US" smtClean="0"/>
-              <a:t>4/1/2019</a:t>
+              <a:t>4/14/2019</a:t>
             </a:fld>
             <a:endParaRPr lang="en-US"/>
           </a:p>
@@ -1252,7 +1257,7 @@
           <a:p>
             <a:fld id="{78C97017-6FC3-485B-9764-EAC9E56C1D49}" type="datetimeFigureOut">
               <a:rPr lang="en-US" smtClean="0"/>
-              <a:t>4/1/2019</a:t>
+              <a:t>4/14/2019</a:t>
             </a:fld>
             <a:endParaRPr lang="en-US"/>
           </a:p>
@@ -1342,7 +1347,7 @@
         </p:nvSpPr>
         <p:spPr>
           <a:xfrm>
-            <a:off x="722313" y="4406902"/>
+            <a:off x="722313" y="4406904"/>
             <a:ext cx="7772400" cy="1362075"/>
           </a:xfrm>
         </p:spPr>
@@ -1497,7 +1502,7 @@
           <a:p>
             <a:fld id="{78C97017-6FC3-485B-9764-EAC9E56C1D49}" type="datetimeFigureOut">
               <a:rPr lang="en-US" smtClean="0"/>
-              <a:t>4/1/2019</a:t>
+              <a:t>4/14/2019</a:t>
             </a:fld>
             <a:endParaRPr lang="en-US"/>
           </a:p>
@@ -1609,7 +1614,7 @@
         </p:nvSpPr>
         <p:spPr>
           <a:xfrm>
-            <a:off x="457200" y="1600202"/>
+            <a:off x="457200" y="1600204"/>
             <a:ext cx="4038600" cy="4525963"/>
           </a:xfrm>
         </p:spPr>
@@ -1693,7 +1698,7 @@
         </p:nvSpPr>
         <p:spPr>
           <a:xfrm>
-            <a:off x="4648200" y="1600202"/>
+            <a:off x="4648200" y="1600204"/>
             <a:ext cx="4038600" cy="4525963"/>
           </a:xfrm>
         </p:spPr>
@@ -1782,7 +1787,7 @@
           <a:p>
             <a:fld id="{78C97017-6FC3-485B-9764-EAC9E56C1D49}" type="datetimeFigureOut">
               <a:rPr lang="en-US" smtClean="0"/>
-              <a:t>4/1/2019</a:t>
+              <a:t>4/14/2019</a:t>
             </a:fld>
             <a:endParaRPr lang="en-US"/>
           </a:p>
@@ -2047,7 +2052,7 @@
         </p:nvSpPr>
         <p:spPr>
           <a:xfrm>
-            <a:off x="4645026" y="1535113"/>
+            <a:off x="4645027" y="1535113"/>
             <a:ext cx="4041775" cy="639762"/>
           </a:xfrm>
         </p:spPr>
@@ -2112,7 +2117,7 @@
         </p:nvSpPr>
         <p:spPr>
           <a:xfrm>
-            <a:off x="4645026" y="2174875"/>
+            <a:off x="4645027" y="2174875"/>
             <a:ext cx="4041775" cy="3951288"/>
           </a:xfrm>
         </p:spPr>
@@ -2201,7 +2206,7 @@
           <a:p>
             <a:fld id="{78C97017-6FC3-485B-9764-EAC9E56C1D49}" type="datetimeFigureOut">
               <a:rPr lang="en-US" smtClean="0"/>
-              <a:t>4/1/2019</a:t>
+              <a:t>4/14/2019</a:t>
             </a:fld>
             <a:endParaRPr lang="en-US"/>
           </a:p>
@@ -2318,7 +2323,7 @@
           <a:p>
             <a:fld id="{78C97017-6FC3-485B-9764-EAC9E56C1D49}" type="datetimeFigureOut">
               <a:rPr lang="en-US" smtClean="0"/>
-              <a:t>4/1/2019</a:t>
+              <a:t>4/14/2019</a:t>
             </a:fld>
             <a:endParaRPr lang="en-US"/>
           </a:p>
@@ -2413,7 +2418,7 @@
           <a:p>
             <a:fld id="{78C97017-6FC3-485B-9764-EAC9E56C1D49}" type="datetimeFigureOut">
               <a:rPr lang="en-US" smtClean="0"/>
-              <a:t>4/1/2019</a:t>
+              <a:t>4/14/2019</a:t>
             </a:fld>
             <a:endParaRPr lang="en-US"/>
           </a:p>
@@ -2503,7 +2508,7 @@
         </p:nvSpPr>
         <p:spPr>
           <a:xfrm>
-            <a:off x="457201" y="273050"/>
+            <a:off x="457202" y="273050"/>
             <a:ext cx="3008313" cy="1162050"/>
           </a:xfrm>
         </p:spPr>
@@ -2534,7 +2539,7 @@
         </p:nvSpPr>
         <p:spPr>
           <a:xfrm>
-            <a:off x="3575050" y="273052"/>
+            <a:off x="3575050" y="273054"/>
             <a:ext cx="5111750" cy="5853113"/>
           </a:xfrm>
         </p:spPr>
@@ -2618,7 +2623,7 @@
         </p:nvSpPr>
         <p:spPr>
           <a:xfrm>
-            <a:off x="457201" y="1435102"/>
+            <a:off x="457202" y="1435103"/>
             <a:ext cx="3008313" cy="4691063"/>
           </a:xfrm>
         </p:spPr>
@@ -2688,7 +2693,7 @@
           <a:p>
             <a:fld id="{78C97017-6FC3-485B-9764-EAC9E56C1D49}" type="datetimeFigureOut">
               <a:rPr lang="en-US" smtClean="0"/>
-              <a:t>4/1/2019</a:t>
+              <a:t>4/14/2019</a:t>
             </a:fld>
             <a:endParaRPr lang="en-US"/>
           </a:p>
@@ -2940,7 +2945,7 @@
           <a:p>
             <a:fld id="{78C97017-6FC3-485B-9764-EAC9E56C1D49}" type="datetimeFigureOut">
               <a:rPr lang="en-US" smtClean="0"/>
-              <a:t>4/1/2019</a:t>
+              <a:t>4/14/2019</a:t>
             </a:fld>
             <a:endParaRPr lang="en-US"/>
           </a:p>
@@ -3067,7 +3072,7 @@
         </p:nvSpPr>
         <p:spPr>
           <a:xfrm>
-            <a:off x="457200" y="1600202"/>
+            <a:off x="457200" y="1600204"/>
             <a:ext cx="8229600" cy="4525963"/>
           </a:xfrm>
           <a:prstGeom prst="rect">
@@ -3128,7 +3133,7 @@
         </p:nvSpPr>
         <p:spPr>
           <a:xfrm>
-            <a:off x="457200" y="6356352"/>
+            <a:off x="457200" y="6356354"/>
             <a:ext cx="2133600" cy="365125"/>
           </a:xfrm>
           <a:prstGeom prst="rect">
@@ -3151,7 +3156,7 @@
           <a:p>
             <a:fld id="{78C97017-6FC3-485B-9764-EAC9E56C1D49}" type="datetimeFigureOut">
               <a:rPr lang="en-US" smtClean="0"/>
-              <a:t>4/1/2019</a:t>
+              <a:t>4/14/2019</a:t>
             </a:fld>
             <a:endParaRPr lang="en-US"/>
           </a:p>
@@ -3169,7 +3174,7 @@
         </p:nvSpPr>
         <p:spPr>
           <a:xfrm>
-            <a:off x="3124200" y="6356352"/>
+            <a:off x="3124200" y="6356354"/>
             <a:ext cx="2895600" cy="365125"/>
           </a:xfrm>
           <a:prstGeom prst="rect">
@@ -3206,7 +3211,7 @@
         </p:nvSpPr>
         <p:spPr>
           <a:xfrm>
-            <a:off x="6553200" y="6356352"/>
+            <a:off x="6553200" y="6356354"/>
             <a:ext cx="2133600" cy="365125"/>
           </a:xfrm>
           <a:prstGeom prst="rect">
@@ -3542,8 +3547,8 @@
         </p:nvSpPr>
         <p:spPr>
           <a:xfrm>
-            <a:off x="-2467894" y="700651"/>
-            <a:ext cx="9931522" cy="5151897"/>
+            <a:off x="-3276600" y="700651"/>
+            <a:ext cx="10740228" cy="5151897"/>
           </a:xfrm>
           <a:prstGeom prst="roundRect">
             <a:avLst>
@@ -3649,8 +3654,8 @@
         </p:nvSpPr>
         <p:spPr>
           <a:xfrm>
-            <a:off x="7674522" y="722290"/>
-            <a:ext cx="2993478" cy="5151897"/>
+            <a:off x="7600450" y="692889"/>
+            <a:ext cx="3219950" cy="5151897"/>
           </a:xfrm>
           <a:prstGeom prst="roundRect">
             <a:avLst>
@@ -3916,7 +3921,7 @@
         </p:nvCxnSpPr>
         <p:spPr>
           <a:xfrm>
-            <a:off x="1015705" y="1481199"/>
+            <a:off x="1015707" y="1481201"/>
             <a:ext cx="39117" cy="2101757"/>
           </a:xfrm>
           <a:prstGeom prst="line">
@@ -3953,7 +3958,7 @@
         </p:nvSpPr>
         <p:spPr>
           <a:xfrm>
-            <a:off x="3830595" y="2548087"/>
+            <a:off x="3830597" y="2548089"/>
             <a:ext cx="123369" cy="728513"/>
           </a:xfrm>
           <a:prstGeom prst="rect">
@@ -4000,7 +4005,7 @@
         </p:nvSpPr>
         <p:spPr>
           <a:xfrm>
-            <a:off x="914401" y="1868170"/>
+            <a:off x="914403" y="1868172"/>
             <a:ext cx="204519" cy="1518445"/>
           </a:xfrm>
           <a:prstGeom prst="rect">
@@ -4051,7 +4056,7 @@
         </p:nvCxnSpPr>
         <p:spPr>
           <a:xfrm flipH="1">
-            <a:off x="3888418" y="2299468"/>
+            <a:off x="3888418" y="2299470"/>
             <a:ext cx="3862" cy="1181403"/>
           </a:xfrm>
           <a:prstGeom prst="line">
@@ -4124,8 +4129,8 @@
         </p:nvSpPr>
         <p:spPr>
           <a:xfrm>
-            <a:off x="-3407830" y="1619681"/>
-            <a:ext cx="1847297" cy="1077218"/>
+            <a:off x="-3200400" y="1619681"/>
+            <a:ext cx="1847297" cy="215444"/>
           </a:xfrm>
           <a:prstGeom prst="rect">
             <a:avLst/>
@@ -4144,7 +4149,7 @@
                   <a:srgbClr val="0070C0"/>
                 </a:solidFill>
               </a:rPr>
-              <a:t>execute(“add n/NUS Computing cc/SGP dv/10/10/2017 r/3 d/My School a/13 Computing Drive, 117417 t/faculty")</a:t>
+              <a:t>execute(“add …")</a:t>
             </a:r>
           </a:p>
         </p:txBody>
@@ -4159,7 +4164,7 @@
         </p:nvCxnSpPr>
         <p:spPr>
           <a:xfrm flipV="1">
-            <a:off x="1096096" y="1980739"/>
+            <a:off x="1096096" y="1980741"/>
             <a:ext cx="2040652" cy="1"/>
           </a:xfrm>
           <a:prstGeom prst="straightConnector1">
@@ -4195,8 +4200,8 @@
         </p:nvSpPr>
         <p:spPr>
           <a:xfrm>
-            <a:off x="1872503" y="3641605"/>
-            <a:ext cx="855809" cy="215444"/>
+            <a:off x="490467" y="3641583"/>
+            <a:ext cx="2834271" cy="215444"/>
           </a:xfrm>
           <a:prstGeom prst="rect">
             <a:avLst/>
@@ -4222,7 +4227,7 @@
           <a:p>
             <a:r>
               <a:rPr lang="en-US" dirty="0"/>
-              <a:t>execute()</a:t>
+              <a:t>execute(model, history)</a:t>
             </a:r>
           </a:p>
         </p:txBody>
@@ -4277,7 +4282,7 @@
         </p:nvCxnSpPr>
         <p:spPr>
           <a:xfrm>
-            <a:off x="1144395" y="3193183"/>
+            <a:off x="1144397" y="3193185"/>
             <a:ext cx="2686197" cy="7217"/>
           </a:xfrm>
           <a:prstGeom prst="straightConnector1">
@@ -4353,7 +4358,7 @@
         </p:nvSpPr>
         <p:spPr>
           <a:xfrm>
-            <a:off x="-1277288" y="1657754"/>
+            <a:off x="-1481123" y="1646324"/>
             <a:ext cx="2207356" cy="215444"/>
           </a:xfrm>
           <a:prstGeom prst="rect">
@@ -4433,8 +4438,8 @@
         </p:nvSpPr>
         <p:spPr>
           <a:xfrm>
-            <a:off x="7924800" y="3077577"/>
-            <a:ext cx="841636" cy="300180"/>
+            <a:off x="7965777" y="3077686"/>
+            <a:ext cx="822685" cy="308931"/>
           </a:xfrm>
           <a:prstGeom prst="rect">
             <a:avLst/>
@@ -4494,7 +4499,7 @@
         </p:nvCxnSpPr>
         <p:spPr>
           <a:xfrm>
-            <a:off x="8361139" y="3363889"/>
+            <a:off x="8361139" y="3363891"/>
             <a:ext cx="10102" cy="1741511"/>
           </a:xfrm>
           <a:prstGeom prst="line">
@@ -4533,8 +4538,8 @@
         </p:nvCxnSpPr>
         <p:spPr>
           <a:xfrm>
-            <a:off x="1137561" y="2604807"/>
-            <a:ext cx="2720479" cy="0"/>
+            <a:off x="1088033" y="2553372"/>
+            <a:ext cx="2742561" cy="0"/>
           </a:xfrm>
           <a:prstGeom prst="straightConnector1">
             <a:avLst/>
@@ -4680,8 +4685,8 @@
         </p:nvCxnSpPr>
         <p:spPr>
           <a:xfrm flipV="1">
-            <a:off x="-1351915" y="3890386"/>
-            <a:ext cx="7812481" cy="11029"/>
+            <a:off x="-1351914" y="3857027"/>
+            <a:ext cx="7823347" cy="15816"/>
           </a:xfrm>
           <a:prstGeom prst="straightConnector1">
             <a:avLst/>
@@ -4724,7 +4729,7 @@
         </p:nvCxnSpPr>
         <p:spPr>
           <a:xfrm>
-            <a:off x="-1336515" y="1905000"/>
+            <a:off x="-1355564" y="1874520"/>
             <a:ext cx="2266585" cy="0"/>
           </a:xfrm>
           <a:prstGeom prst="straightConnector1">
@@ -4768,7 +4773,7 @@
         </p:nvCxnSpPr>
         <p:spPr>
           <a:xfrm>
-            <a:off x="-1313405" y="4800926"/>
+            <a:off x="-1313404" y="4800926"/>
             <a:ext cx="7784837" cy="0"/>
           </a:xfrm>
           <a:prstGeom prst="straightConnector1">
@@ -4800,10 +4805,75 @@
       </p:cxnSp>
       <p:sp>
         <p:nvSpPr>
-          <p:cNvPr id="47" name="TextBox 46">
+          <p:cNvPr id="51" name="Rectangle 62">
             <a:extLst>
               <a:ext uri="{FF2B5EF4-FFF2-40B4-BE49-F238E27FC236}">
-                <a16:creationId xmlns:a16="http://schemas.microsoft.com/office/drawing/2014/main" id="{90E1B110-D951-4D18-87D6-15DCDA58B69B}"/>
+                <a16:creationId xmlns:a16="http://schemas.microsoft.com/office/drawing/2014/main" id="{5EC97B0A-7289-495B-8356-E4A4DEB293EF}"/>
+              </a:ext>
+            </a:extLst>
+          </p:cNvPr>
+          <p:cNvSpPr/>
+          <p:nvPr/>
+        </p:nvSpPr>
+        <p:spPr>
+          <a:xfrm>
+            <a:off x="5661972" y="2508122"/>
+            <a:ext cx="1635602" cy="461538"/>
+          </a:xfrm>
+          <a:prstGeom prst="rect">
+            <a:avLst/>
+          </a:prstGeom>
+          <a:solidFill>
+            <a:srgbClr val="0070C0"/>
+          </a:solidFill>
+          <a:ln w="19050">
+            <a:solidFill>
+              <a:srgbClr val="0070C0"/>
+            </a:solidFill>
+          </a:ln>
+          <a:effectLst/>
+        </p:spPr>
+        <p:style>
+          <a:lnRef idx="1">
+            <a:schemeClr val="accent2"/>
+          </a:lnRef>
+          <a:fillRef idx="2">
+            <a:schemeClr val="accent2"/>
+          </a:fillRef>
+          <a:effectRef idx="1">
+            <a:schemeClr val="accent2"/>
+          </a:effectRef>
+          <a:fontRef idx="minor">
+            <a:schemeClr val="dk1"/>
+          </a:fontRef>
+        </p:style>
+        <p:txBody>
+          <a:bodyPr rtlCol="0" anchor="ctr"/>
+          <a:lstStyle/>
+          <a:p>
+            <a:pPr algn="ctr"/>
+            <a:r>
+              <a:rPr lang="en-US" sz="1600" dirty="0">
+                <a:solidFill>
+                  <a:schemeClr val="bg1"/>
+                </a:solidFill>
+              </a:rPr>
+              <a:t>a:AddCommand</a:t>
+            </a:r>
+            <a:endParaRPr lang="en-SG" sz="1600" dirty="0">
+              <a:solidFill>
+                <a:schemeClr val="bg1"/>
+              </a:solidFill>
+            </a:endParaRPr>
+          </a:p>
+        </p:txBody>
+      </p:sp>
+      <p:sp>
+        <p:nvSpPr>
+          <p:cNvPr id="57" name="TextBox 56">
+            <a:extLst>
+              <a:ext uri="{FF2B5EF4-FFF2-40B4-BE49-F238E27FC236}">
+                <a16:creationId xmlns:a16="http://schemas.microsoft.com/office/drawing/2014/main" id="{9B128A04-D620-4490-80E7-830DB8A94CF1}"/>
               </a:ext>
             </a:extLst>
           </p:cNvPr>
@@ -4812,8 +4882,8 @@
         </p:nvSpPr>
         <p:spPr>
           <a:xfrm>
-            <a:off x="1066800" y="1752600"/>
-            <a:ext cx="1924686" cy="215444"/>
+            <a:off x="1219200" y="2356306"/>
+            <a:ext cx="1756536" cy="215444"/>
           </a:xfrm>
           <a:prstGeom prst="rect">
             <a:avLst/>
@@ -4839,17 +4909,17 @@
           <a:p>
             <a:r>
               <a:rPr lang="en-US" dirty="0"/>
-              <a:t>AddCommandParser()</a:t>
-            </a:r>
-          </a:p>
-        </p:txBody>
-      </p:sp>
-      <p:sp>
-        <p:nvSpPr>
-          <p:cNvPr id="51" name="Rectangle 62">
+              <a:t>parse(“add”)</a:t>
+            </a:r>
+          </a:p>
+        </p:txBody>
+      </p:sp>
+      <p:sp>
+        <p:nvSpPr>
+          <p:cNvPr id="59" name="Rectangle 58">
             <a:extLst>
               <a:ext uri="{FF2B5EF4-FFF2-40B4-BE49-F238E27FC236}">
-                <a16:creationId xmlns:a16="http://schemas.microsoft.com/office/drawing/2014/main" id="{5EC97B0A-7289-495B-8356-E4A4DEB293EF}"/>
+                <a16:creationId xmlns:a16="http://schemas.microsoft.com/office/drawing/2014/main" id="{66C84D38-7A2C-4F22-B5E0-24F3E89BA922}"/>
               </a:ext>
             </a:extLst>
           </p:cNvPr>
@@ -4858,8 +4928,8 @@
         </p:nvSpPr>
         <p:spPr>
           <a:xfrm>
-            <a:off x="5661972" y="2508122"/>
-            <a:ext cx="1635602" cy="461538"/>
+            <a:off x="6439156" y="2931824"/>
+            <a:ext cx="152200" cy="171073"/>
           </a:xfrm>
           <a:prstGeom prst="rect">
             <a:avLst/>
@@ -4867,7 +4937,7 @@
           <a:solidFill>
             <a:srgbClr val="0070C0"/>
           </a:solidFill>
-          <a:ln w="19050">
+          <a:ln>
             <a:solidFill>
               <a:srgbClr val="0070C0"/>
             </a:solidFill>
@@ -4876,13 +4946,13 @@
         </p:spPr>
         <p:style>
           <a:lnRef idx="1">
-            <a:schemeClr val="accent2"/>
+            <a:schemeClr val="accent3"/>
           </a:lnRef>
           <a:fillRef idx="2">
-            <a:schemeClr val="accent2"/>
+            <a:schemeClr val="accent3"/>
           </a:fillRef>
           <a:effectRef idx="1">
-            <a:schemeClr val="accent2"/>
+            <a:schemeClr val="accent3"/>
           </a:effectRef>
           <a:fontRef idx="minor">
             <a:schemeClr val="dk1"/>
@@ -4893,28 +4963,16 @@
           <a:lstStyle/>
           <a:p>
             <a:pPr algn="ctr"/>
-            <a:r>
-              <a:rPr lang="en-US" sz="1600" dirty="0">
-                <a:solidFill>
-                  <a:schemeClr val="bg1"/>
-                </a:solidFill>
-              </a:rPr>
-              <a:t>:AddCommand</a:t>
-            </a:r>
-            <a:endParaRPr lang="en-SG" sz="1600" dirty="0">
-              <a:solidFill>
-                <a:schemeClr val="bg1"/>
-              </a:solidFill>
-            </a:endParaRPr>
-          </a:p>
-        </p:txBody>
-      </p:sp>
-      <p:sp>
-        <p:nvSpPr>
-          <p:cNvPr id="57" name="TextBox 56">
+            <a:endParaRPr lang="en-SG" sz="1400"/>
+          </a:p>
+        </p:txBody>
+      </p:sp>
+      <p:sp>
+        <p:nvSpPr>
+          <p:cNvPr id="72" name="TextBox 71">
             <a:extLst>
               <a:ext uri="{FF2B5EF4-FFF2-40B4-BE49-F238E27FC236}">
-                <a16:creationId xmlns:a16="http://schemas.microsoft.com/office/drawing/2014/main" id="{9B128A04-D620-4490-80E7-830DB8A94CF1}"/>
+                <a16:creationId xmlns:a16="http://schemas.microsoft.com/office/drawing/2014/main" id="{68167AA0-3158-4F4A-8457-727D82EBCC30}"/>
               </a:ext>
             </a:extLst>
           </p:cNvPr>
@@ -4923,8 +4981,8 @@
         </p:nvSpPr>
         <p:spPr>
           <a:xfrm>
-            <a:off x="1752600" y="2394994"/>
-            <a:ext cx="1756536" cy="215444"/>
+            <a:off x="6508891" y="3796008"/>
+            <a:ext cx="1589036" cy="184666"/>
           </a:xfrm>
           <a:prstGeom prst="rect">
             <a:avLst/>
@@ -4949,18 +5007,18 @@
           </a:lstStyle>
           <a:p>
             <a:r>
-              <a:rPr lang="en-US" dirty="0"/>
-              <a:t>parse(“add”)</a:t>
-            </a:r>
-          </a:p>
-        </p:txBody>
-      </p:sp>
-      <p:sp>
-        <p:nvSpPr>
-          <p:cNvPr id="59" name="Rectangle 58">
+              <a:rPr lang="en-US" sz="1200" dirty="0"/>
+              <a:t>addPlace(toAdd)</a:t>
+            </a:r>
+          </a:p>
+        </p:txBody>
+      </p:sp>
+      <p:sp>
+        <p:nvSpPr>
+          <p:cNvPr id="85" name="Rectangle 84">
             <a:extLst>
               <a:ext uri="{FF2B5EF4-FFF2-40B4-BE49-F238E27FC236}">
-                <a16:creationId xmlns:a16="http://schemas.microsoft.com/office/drawing/2014/main" id="{66C84D38-7A2C-4F22-B5E0-24F3E89BA922}"/>
+                <a16:creationId xmlns:a16="http://schemas.microsoft.com/office/drawing/2014/main" id="{3AFEEBFE-32B8-45E5-952F-30F9106A9F10}"/>
               </a:ext>
             </a:extLst>
           </p:cNvPr>
@@ -4969,18 +5027,18 @@
         </p:nvSpPr>
         <p:spPr>
           <a:xfrm>
-            <a:off x="6439156" y="2931822"/>
-            <a:ext cx="152200" cy="171073"/>
+            <a:off x="8254435" y="4023963"/>
+            <a:ext cx="233617" cy="702777"/>
           </a:xfrm>
           <a:prstGeom prst="rect">
             <a:avLst/>
           </a:prstGeom>
           <a:solidFill>
-            <a:srgbClr val="0070C0"/>
+            <a:srgbClr val="7030A0"/>
           </a:solidFill>
           <a:ln>
             <a:solidFill>
-              <a:srgbClr val="0070C0"/>
+              <a:srgbClr val="7030A0"/>
             </a:solidFill>
           </a:ln>
           <a:effectLst/>
@@ -5008,12 +5066,265 @@
           </a:p>
         </p:txBody>
       </p:sp>
-      <p:sp>
-        <p:nvSpPr>
-          <p:cNvPr id="72" name="TextBox 71">
+      <p:cxnSp>
+        <p:nvCxnSpPr>
+          <p:cNvPr id="87" name="Straight Arrow Connector 86">
             <a:extLst>
               <a:ext uri="{FF2B5EF4-FFF2-40B4-BE49-F238E27FC236}">
-                <a16:creationId xmlns:a16="http://schemas.microsoft.com/office/drawing/2014/main" id="{68167AA0-3158-4F4A-8457-727D82EBCC30}"/>
+                <a16:creationId xmlns:a16="http://schemas.microsoft.com/office/drawing/2014/main" id="{47C11F1D-CE85-4565-AEBF-89F53B5CC4F1}"/>
+              </a:ext>
+            </a:extLst>
+          </p:cNvPr>
+          <p:cNvCxnSpPr>
+            <a:cxnSpLocks/>
+          </p:cNvCxnSpPr>
+          <p:nvPr/>
+        </p:nvCxnSpPr>
+        <p:spPr>
+          <a:xfrm>
+            <a:off x="6628566" y="4191000"/>
+            <a:ext cx="1704005" cy="0"/>
+          </a:xfrm>
+          <a:prstGeom prst="straightConnector1">
+            <a:avLst/>
+          </a:prstGeom>
+          <a:ln w="19050">
+            <a:solidFill>
+              <a:srgbClr val="7030A0"/>
+            </a:solidFill>
+            <a:prstDash val="sysDash"/>
+            <a:headEnd type="arrow" w="med" len="med"/>
+            <a:tailEnd type="none" w="med" len="med"/>
+          </a:ln>
+        </p:spPr>
+        <p:style>
+          <a:lnRef idx="1">
+            <a:schemeClr val="accent1"/>
+          </a:lnRef>
+          <a:fillRef idx="0">
+            <a:schemeClr val="accent1"/>
+          </a:fillRef>
+          <a:effectRef idx="0">
+            <a:schemeClr val="accent1"/>
+          </a:effectRef>
+          <a:fontRef idx="minor">
+            <a:schemeClr val="tx1"/>
+          </a:fontRef>
+        </p:style>
+      </p:cxnSp>
+      <p:sp>
+        <p:nvSpPr>
+          <p:cNvPr id="41" name="Rectangle 62">
+            <a:extLst>
+              <a:ext uri="{FF2B5EF4-FFF2-40B4-BE49-F238E27FC236}">
+                <a16:creationId xmlns:a16="http://schemas.microsoft.com/office/drawing/2014/main" id="{B78A3FC8-6CAF-49AD-A43C-FFC02BAE2D9C}"/>
+              </a:ext>
+            </a:extLst>
+          </p:cNvPr>
+          <p:cNvSpPr/>
+          <p:nvPr/>
+        </p:nvSpPr>
+        <p:spPr>
+          <a:xfrm>
+            <a:off x="9214449" y="3463748"/>
+            <a:ext cx="1381310" cy="300180"/>
+          </a:xfrm>
+          <a:prstGeom prst="rect">
+            <a:avLst/>
+          </a:prstGeom>
+          <a:solidFill>
+            <a:srgbClr val="7030A0"/>
+          </a:solidFill>
+          <a:ln w="19050">
+            <a:solidFill>
+              <a:srgbClr val="7030A0"/>
+            </a:solidFill>
+          </a:ln>
+          <a:effectLst/>
+        </p:spPr>
+        <p:style>
+          <a:lnRef idx="1">
+            <a:schemeClr val="accent2"/>
+          </a:lnRef>
+          <a:fillRef idx="2">
+            <a:schemeClr val="accent2"/>
+          </a:fillRef>
+          <a:effectRef idx="1">
+            <a:schemeClr val="accent2"/>
+          </a:effectRef>
+          <a:fontRef idx="minor">
+            <a:schemeClr val="dk1"/>
+          </a:fontRef>
+        </p:style>
+        <p:txBody>
+          <a:bodyPr rtlCol="0" anchor="ctr"/>
+          <a:lstStyle/>
+          <a:p>
+            <a:pPr algn="ctr"/>
+            <a:r>
+              <a:rPr lang="en-US" sz="1600" dirty="0">
+                <a:solidFill>
+                  <a:schemeClr val="bg1"/>
+                </a:solidFill>
+              </a:rPr>
+              <a:t>:TravelBuddy</a:t>
+            </a:r>
+            <a:endParaRPr lang="en-SG" sz="1600" dirty="0">
+              <a:solidFill>
+                <a:schemeClr val="bg1"/>
+              </a:solidFill>
+            </a:endParaRPr>
+          </a:p>
+        </p:txBody>
+      </p:sp>
+      <p:cxnSp>
+        <p:nvCxnSpPr>
+          <p:cNvPr id="45" name="Straight Connector 44">
+            <a:extLst>
+              <a:ext uri="{FF2B5EF4-FFF2-40B4-BE49-F238E27FC236}">
+                <a16:creationId xmlns:a16="http://schemas.microsoft.com/office/drawing/2014/main" id="{CFD98A32-7C4C-4E96-8F24-54B792BF6158}"/>
+              </a:ext>
+            </a:extLst>
+          </p:cNvPr>
+          <p:cNvCxnSpPr>
+            <a:cxnSpLocks/>
+          </p:cNvCxnSpPr>
+          <p:nvPr/>
+        </p:nvCxnSpPr>
+        <p:spPr>
+          <a:xfrm>
+            <a:off x="10003388" y="3755848"/>
+            <a:ext cx="4297" cy="1054295"/>
+          </a:xfrm>
+          <a:prstGeom prst="line">
+            <a:avLst/>
+          </a:prstGeom>
+          <a:ln w="19050">
+            <a:solidFill>
+              <a:srgbClr val="7030A0"/>
+            </a:solidFill>
+            <a:prstDash val="sysDash"/>
+          </a:ln>
+          <a:effectLst/>
+        </p:spPr>
+        <p:style>
+          <a:lnRef idx="1">
+            <a:schemeClr val="accent1"/>
+          </a:lnRef>
+          <a:fillRef idx="2">
+            <a:schemeClr val="accent1"/>
+          </a:fillRef>
+          <a:effectRef idx="1">
+            <a:schemeClr val="accent1"/>
+          </a:effectRef>
+          <a:fontRef idx="minor">
+            <a:schemeClr val="dk1"/>
+          </a:fontRef>
+        </p:style>
+      </p:cxnSp>
+      <p:sp>
+        <p:nvSpPr>
+          <p:cNvPr id="48" name="Rectangle 47">
+            <a:extLst>
+              <a:ext uri="{FF2B5EF4-FFF2-40B4-BE49-F238E27FC236}">
+                <a16:creationId xmlns:a16="http://schemas.microsoft.com/office/drawing/2014/main" id="{A837F9B3-2EF2-40A4-B6F1-80480B194316}"/>
+              </a:ext>
+            </a:extLst>
+          </p:cNvPr>
+          <p:cNvSpPr/>
+          <p:nvPr/>
+        </p:nvSpPr>
+        <p:spPr>
+          <a:xfrm>
+            <a:off x="9894271" y="4176288"/>
+            <a:ext cx="207284" cy="374664"/>
+          </a:xfrm>
+          <a:prstGeom prst="rect">
+            <a:avLst/>
+          </a:prstGeom>
+          <a:solidFill>
+            <a:srgbClr val="7030A0"/>
+          </a:solidFill>
+          <a:ln>
+            <a:solidFill>
+              <a:srgbClr val="7030A0"/>
+            </a:solidFill>
+          </a:ln>
+          <a:effectLst/>
+        </p:spPr>
+        <p:style>
+          <a:lnRef idx="1">
+            <a:schemeClr val="accent3"/>
+          </a:lnRef>
+          <a:fillRef idx="2">
+            <a:schemeClr val="accent3"/>
+          </a:fillRef>
+          <a:effectRef idx="1">
+            <a:schemeClr val="accent3"/>
+          </a:effectRef>
+          <a:fontRef idx="minor">
+            <a:schemeClr val="dk1"/>
+          </a:fontRef>
+        </p:style>
+        <p:txBody>
+          <a:bodyPr rtlCol="0" anchor="ctr"/>
+          <a:lstStyle/>
+          <a:p>
+            <a:pPr algn="ctr"/>
+            <a:endParaRPr lang="en-SG" sz="1400"/>
+          </a:p>
+        </p:txBody>
+      </p:sp>
+      <p:cxnSp>
+        <p:nvCxnSpPr>
+          <p:cNvPr id="49" name="Straight Arrow Connector 48">
+            <a:extLst>
+              <a:ext uri="{FF2B5EF4-FFF2-40B4-BE49-F238E27FC236}">
+                <a16:creationId xmlns:a16="http://schemas.microsoft.com/office/drawing/2014/main" id="{550D14CF-BEC3-4372-ACC9-ED21B41B80BB}"/>
+              </a:ext>
+            </a:extLst>
+          </p:cNvPr>
+          <p:cNvCxnSpPr>
+            <a:cxnSpLocks/>
+          </p:cNvCxnSpPr>
+          <p:nvPr/>
+        </p:nvCxnSpPr>
+        <p:spPr>
+          <a:xfrm>
+            <a:off x="8439103" y="4180147"/>
+            <a:ext cx="1455168" cy="0"/>
+          </a:xfrm>
+          <a:prstGeom prst="straightConnector1">
+            <a:avLst/>
+          </a:prstGeom>
+          <a:ln w="19050">
+            <a:solidFill>
+              <a:srgbClr val="7030A0"/>
+            </a:solidFill>
+            <a:tailEnd type="arrow"/>
+          </a:ln>
+        </p:spPr>
+        <p:style>
+          <a:lnRef idx="1">
+            <a:schemeClr val="accent1"/>
+          </a:lnRef>
+          <a:fillRef idx="0">
+            <a:schemeClr val="accent1"/>
+          </a:fillRef>
+          <a:effectRef idx="0">
+            <a:schemeClr val="accent1"/>
+          </a:effectRef>
+          <a:fontRef idx="minor">
+            <a:schemeClr val="tx1"/>
+          </a:fontRef>
+        </p:style>
+      </p:cxnSp>
+      <p:sp>
+        <p:nvSpPr>
+          <p:cNvPr id="53" name="TextBox 52">
+            <a:extLst>
+              <a:ext uri="{FF2B5EF4-FFF2-40B4-BE49-F238E27FC236}">
+                <a16:creationId xmlns:a16="http://schemas.microsoft.com/office/drawing/2014/main" id="{054B2561-8A46-4166-951D-EFC4F2D338B2}"/>
               </a:ext>
             </a:extLst>
           </p:cNvPr>
@@ -5022,8 +5333,8 @@
         </p:nvSpPr>
         <p:spPr>
           <a:xfrm>
-            <a:off x="6508891" y="3796008"/>
-            <a:ext cx="1589036" cy="184666"/>
+            <a:off x="8238414" y="3983355"/>
+            <a:ext cx="1500376" cy="184666"/>
           </a:xfrm>
           <a:prstGeom prst="rect">
             <a:avLst/>
@@ -5048,358 +5359,6 @@
           </a:lstStyle>
           <a:p>
             <a:r>
-              <a:rPr lang="en-US" sz="1200" dirty="0"/>
-              <a:t>addPlace(toAdd)</a:t>
-            </a:r>
-          </a:p>
-        </p:txBody>
-      </p:sp>
-      <p:sp>
-        <p:nvSpPr>
-          <p:cNvPr id="85" name="Rectangle 84">
-            <a:extLst>
-              <a:ext uri="{FF2B5EF4-FFF2-40B4-BE49-F238E27FC236}">
-                <a16:creationId xmlns:a16="http://schemas.microsoft.com/office/drawing/2014/main" id="{3AFEEBFE-32B8-45E5-952F-30F9106A9F10}"/>
-              </a:ext>
-            </a:extLst>
-          </p:cNvPr>
-          <p:cNvSpPr/>
-          <p:nvPr/>
-        </p:nvSpPr>
-        <p:spPr>
-          <a:xfrm>
-            <a:off x="8254433" y="4023961"/>
-            <a:ext cx="233617" cy="702777"/>
-          </a:xfrm>
-          <a:prstGeom prst="rect">
-            <a:avLst/>
-          </a:prstGeom>
-          <a:solidFill>
-            <a:srgbClr val="7030A0"/>
-          </a:solidFill>
-          <a:ln>
-            <a:solidFill>
-              <a:srgbClr val="7030A0"/>
-            </a:solidFill>
-          </a:ln>
-          <a:effectLst/>
-        </p:spPr>
-        <p:style>
-          <a:lnRef idx="1">
-            <a:schemeClr val="accent3"/>
-          </a:lnRef>
-          <a:fillRef idx="2">
-            <a:schemeClr val="accent3"/>
-          </a:fillRef>
-          <a:effectRef idx="1">
-            <a:schemeClr val="accent3"/>
-          </a:effectRef>
-          <a:fontRef idx="minor">
-            <a:schemeClr val="dk1"/>
-          </a:fontRef>
-        </p:style>
-        <p:txBody>
-          <a:bodyPr rtlCol="0" anchor="ctr"/>
-          <a:lstStyle/>
-          <a:p>
-            <a:pPr algn="ctr"/>
-            <a:endParaRPr lang="en-SG" sz="1400"/>
-          </a:p>
-        </p:txBody>
-      </p:sp>
-      <p:cxnSp>
-        <p:nvCxnSpPr>
-          <p:cNvPr id="87" name="Straight Arrow Connector 86">
-            <a:extLst>
-              <a:ext uri="{FF2B5EF4-FFF2-40B4-BE49-F238E27FC236}">
-                <a16:creationId xmlns:a16="http://schemas.microsoft.com/office/drawing/2014/main" id="{47C11F1D-CE85-4565-AEBF-89F53B5CC4F1}"/>
-              </a:ext>
-            </a:extLst>
-          </p:cNvPr>
-          <p:cNvCxnSpPr>
-            <a:cxnSpLocks/>
-          </p:cNvCxnSpPr>
-          <p:nvPr/>
-        </p:nvCxnSpPr>
-        <p:spPr>
-          <a:xfrm>
-            <a:off x="6628564" y="4191000"/>
-            <a:ext cx="1704005" cy="0"/>
-          </a:xfrm>
-          <a:prstGeom prst="straightConnector1">
-            <a:avLst/>
-          </a:prstGeom>
-          <a:ln w="19050">
-            <a:solidFill>
-              <a:srgbClr val="7030A0"/>
-            </a:solidFill>
-            <a:prstDash val="sysDash"/>
-            <a:headEnd type="arrow" w="med" len="med"/>
-            <a:tailEnd type="none" w="med" len="med"/>
-          </a:ln>
-        </p:spPr>
-        <p:style>
-          <a:lnRef idx="1">
-            <a:schemeClr val="accent1"/>
-          </a:lnRef>
-          <a:fillRef idx="0">
-            <a:schemeClr val="accent1"/>
-          </a:fillRef>
-          <a:effectRef idx="0">
-            <a:schemeClr val="accent1"/>
-          </a:effectRef>
-          <a:fontRef idx="minor">
-            <a:schemeClr val="tx1"/>
-          </a:fontRef>
-        </p:style>
-      </p:cxnSp>
-      <p:sp>
-        <p:nvSpPr>
-          <p:cNvPr id="41" name="Rectangle 62">
-            <a:extLst>
-              <a:ext uri="{FF2B5EF4-FFF2-40B4-BE49-F238E27FC236}">
-                <a16:creationId xmlns:a16="http://schemas.microsoft.com/office/drawing/2014/main" id="{B78A3FC8-6CAF-49AD-A43C-FFC02BAE2D9C}"/>
-              </a:ext>
-            </a:extLst>
-          </p:cNvPr>
-          <p:cNvSpPr/>
-          <p:nvPr/>
-        </p:nvSpPr>
-        <p:spPr>
-          <a:xfrm>
-            <a:off x="9214449" y="3463748"/>
-            <a:ext cx="1381310" cy="300180"/>
-          </a:xfrm>
-          <a:prstGeom prst="rect">
-            <a:avLst/>
-          </a:prstGeom>
-          <a:solidFill>
-            <a:srgbClr val="7030A0"/>
-          </a:solidFill>
-          <a:ln w="19050">
-            <a:solidFill>
-              <a:srgbClr val="7030A0"/>
-            </a:solidFill>
-          </a:ln>
-          <a:effectLst/>
-        </p:spPr>
-        <p:style>
-          <a:lnRef idx="1">
-            <a:schemeClr val="accent2"/>
-          </a:lnRef>
-          <a:fillRef idx="2">
-            <a:schemeClr val="accent2"/>
-          </a:fillRef>
-          <a:effectRef idx="1">
-            <a:schemeClr val="accent2"/>
-          </a:effectRef>
-          <a:fontRef idx="minor">
-            <a:schemeClr val="dk1"/>
-          </a:fontRef>
-        </p:style>
-        <p:txBody>
-          <a:bodyPr rtlCol="0" anchor="ctr"/>
-          <a:lstStyle/>
-          <a:p>
-            <a:pPr algn="ctr"/>
-            <a:r>
-              <a:rPr lang="en-US" sz="1600" dirty="0">
-                <a:solidFill>
-                  <a:schemeClr val="bg1"/>
-                </a:solidFill>
-              </a:rPr>
-              <a:t>:TravelBuddy</a:t>
-            </a:r>
-            <a:endParaRPr lang="en-SG" sz="1600" dirty="0">
-              <a:solidFill>
-                <a:schemeClr val="bg1"/>
-              </a:solidFill>
-            </a:endParaRPr>
-          </a:p>
-        </p:txBody>
-      </p:sp>
-      <p:cxnSp>
-        <p:nvCxnSpPr>
-          <p:cNvPr id="45" name="Straight Connector 44">
-            <a:extLst>
-              <a:ext uri="{FF2B5EF4-FFF2-40B4-BE49-F238E27FC236}">
-                <a16:creationId xmlns:a16="http://schemas.microsoft.com/office/drawing/2014/main" id="{CFD98A32-7C4C-4E96-8F24-54B792BF6158}"/>
-              </a:ext>
-            </a:extLst>
-          </p:cNvPr>
-          <p:cNvCxnSpPr>
-            <a:cxnSpLocks/>
-          </p:cNvCxnSpPr>
-          <p:nvPr/>
-        </p:nvCxnSpPr>
-        <p:spPr>
-          <a:xfrm>
-            <a:off x="10003388" y="3755848"/>
-            <a:ext cx="4297" cy="1054295"/>
-          </a:xfrm>
-          <a:prstGeom prst="line">
-            <a:avLst/>
-          </a:prstGeom>
-          <a:ln w="19050">
-            <a:solidFill>
-              <a:srgbClr val="7030A0"/>
-            </a:solidFill>
-            <a:prstDash val="sysDash"/>
-          </a:ln>
-          <a:effectLst/>
-        </p:spPr>
-        <p:style>
-          <a:lnRef idx="1">
-            <a:schemeClr val="accent1"/>
-          </a:lnRef>
-          <a:fillRef idx="2">
-            <a:schemeClr val="accent1"/>
-          </a:fillRef>
-          <a:effectRef idx="1">
-            <a:schemeClr val="accent1"/>
-          </a:effectRef>
-          <a:fontRef idx="minor">
-            <a:schemeClr val="dk1"/>
-          </a:fontRef>
-        </p:style>
-      </p:cxnSp>
-      <p:sp>
-        <p:nvSpPr>
-          <p:cNvPr id="48" name="Rectangle 47">
-            <a:extLst>
-              <a:ext uri="{FF2B5EF4-FFF2-40B4-BE49-F238E27FC236}">
-                <a16:creationId xmlns:a16="http://schemas.microsoft.com/office/drawing/2014/main" id="{A837F9B3-2EF2-40A4-B6F1-80480B194316}"/>
-              </a:ext>
-            </a:extLst>
-          </p:cNvPr>
-          <p:cNvSpPr/>
-          <p:nvPr/>
-        </p:nvSpPr>
-        <p:spPr>
-          <a:xfrm>
-            <a:off x="9894271" y="4176288"/>
-            <a:ext cx="207284" cy="374664"/>
-          </a:xfrm>
-          <a:prstGeom prst="rect">
-            <a:avLst/>
-          </a:prstGeom>
-          <a:solidFill>
-            <a:srgbClr val="7030A0"/>
-          </a:solidFill>
-          <a:ln>
-            <a:solidFill>
-              <a:srgbClr val="7030A0"/>
-            </a:solidFill>
-          </a:ln>
-          <a:effectLst/>
-        </p:spPr>
-        <p:style>
-          <a:lnRef idx="1">
-            <a:schemeClr val="accent3"/>
-          </a:lnRef>
-          <a:fillRef idx="2">
-            <a:schemeClr val="accent3"/>
-          </a:fillRef>
-          <a:effectRef idx="1">
-            <a:schemeClr val="accent3"/>
-          </a:effectRef>
-          <a:fontRef idx="minor">
-            <a:schemeClr val="dk1"/>
-          </a:fontRef>
-        </p:style>
-        <p:txBody>
-          <a:bodyPr rtlCol="0" anchor="ctr"/>
-          <a:lstStyle/>
-          <a:p>
-            <a:pPr algn="ctr"/>
-            <a:endParaRPr lang="en-SG" sz="1400"/>
-          </a:p>
-        </p:txBody>
-      </p:sp>
-      <p:cxnSp>
-        <p:nvCxnSpPr>
-          <p:cNvPr id="49" name="Straight Arrow Connector 48">
-            <a:extLst>
-              <a:ext uri="{FF2B5EF4-FFF2-40B4-BE49-F238E27FC236}">
-                <a16:creationId xmlns:a16="http://schemas.microsoft.com/office/drawing/2014/main" id="{550D14CF-BEC3-4372-ACC9-ED21B41B80BB}"/>
-              </a:ext>
-            </a:extLst>
-          </p:cNvPr>
-          <p:cNvCxnSpPr>
-            <a:cxnSpLocks/>
-          </p:cNvCxnSpPr>
-          <p:nvPr/>
-        </p:nvCxnSpPr>
-        <p:spPr>
-          <a:xfrm>
-            <a:off x="8439103" y="4231582"/>
-            <a:ext cx="1455168" cy="0"/>
-          </a:xfrm>
-          <a:prstGeom prst="straightConnector1">
-            <a:avLst/>
-          </a:prstGeom>
-          <a:ln w="19050">
-            <a:solidFill>
-              <a:srgbClr val="7030A0"/>
-            </a:solidFill>
-            <a:tailEnd type="arrow"/>
-          </a:ln>
-        </p:spPr>
-        <p:style>
-          <a:lnRef idx="1">
-            <a:schemeClr val="accent1"/>
-          </a:lnRef>
-          <a:fillRef idx="0">
-            <a:schemeClr val="accent1"/>
-          </a:fillRef>
-          <a:effectRef idx="0">
-            <a:schemeClr val="accent1"/>
-          </a:effectRef>
-          <a:fontRef idx="minor">
-            <a:schemeClr val="tx1"/>
-          </a:fontRef>
-        </p:style>
-      </p:cxnSp>
-      <p:sp>
-        <p:nvSpPr>
-          <p:cNvPr id="53" name="TextBox 52">
-            <a:extLst>
-              <a:ext uri="{FF2B5EF4-FFF2-40B4-BE49-F238E27FC236}">
-                <a16:creationId xmlns:a16="http://schemas.microsoft.com/office/drawing/2014/main" id="{054B2561-8A46-4166-951D-EFC4F2D338B2}"/>
-              </a:ext>
-            </a:extLst>
-          </p:cNvPr>
-          <p:cNvSpPr txBox="1"/>
-          <p:nvPr/>
-        </p:nvSpPr>
-        <p:spPr>
-          <a:xfrm>
-            <a:off x="8398454" y="3988979"/>
-            <a:ext cx="1500376" cy="184666"/>
-          </a:xfrm>
-          <a:prstGeom prst="rect">
-            <a:avLst/>
-          </a:prstGeom>
-          <a:noFill/>
-        </p:spPr>
-        <p:txBody>
-          <a:bodyPr wrap="square" lIns="0" tIns="0" rIns="0" bIns="0" rtlCol="0">
-            <a:spAutoFit/>
-          </a:bodyPr>
-          <a:lstStyle>
-            <a:defPPr>
-              <a:defRPr lang="en-US"/>
-            </a:defPPr>
-            <a:lvl1pPr algn="r">
-              <a:defRPr sz="1400">
-                <a:solidFill>
-                  <a:srgbClr val="0070C0"/>
-                </a:solidFill>
-              </a:defRPr>
-            </a:lvl1pPr>
-          </a:lstStyle>
-          <a:p>
-            <a:r>
               <a:rPr lang="en-US" sz="1200" dirty="0">
                 <a:solidFill>
                   <a:srgbClr val="7030A0"/>
@@ -5426,9 +5385,9 @@
           <p:nvPr/>
         </p:nvCxnSpPr>
         <p:spPr>
-          <a:xfrm>
-            <a:off x="8458200" y="4550951"/>
-            <a:ext cx="1399603" cy="0"/>
+          <a:xfrm flipV="1">
+            <a:off x="8488052" y="4550951"/>
+            <a:ext cx="1369753" cy="1"/>
           </a:xfrm>
           <a:prstGeom prst="straightConnector1">
             <a:avLst/>
@@ -5512,9 +5471,9 @@
           <p:nvPr/>
         </p:nvCxnSpPr>
         <p:spPr>
-          <a:xfrm>
-            <a:off x="3931920" y="2733040"/>
-            <a:ext cx="1730052" cy="5851"/>
+          <a:xfrm flipV="1">
+            <a:off x="3939942" y="2738891"/>
+            <a:ext cx="1722030" cy="2"/>
           </a:xfrm>
           <a:prstGeom prst="straightConnector1">
             <a:avLst/>
@@ -5557,7 +5516,7 @@
         </p:nvCxnSpPr>
         <p:spPr>
           <a:xfrm>
-            <a:off x="-1313405" y="3371445"/>
+            <a:off x="-1313404" y="3371447"/>
             <a:ext cx="2256705" cy="1"/>
           </a:xfrm>
           <a:prstGeom prst="straightConnector1">
@@ -5656,7 +5615,7 @@
         </p:nvCxnSpPr>
         <p:spPr>
           <a:xfrm>
-            <a:off x="6629400" y="4049953"/>
+            <a:off x="6629402" y="4030903"/>
             <a:ext cx="1615169" cy="0"/>
           </a:xfrm>
           <a:prstGeom prst="straightConnector1">
@@ -5700,7 +5659,7 @@
         </p:nvCxnSpPr>
         <p:spPr>
           <a:xfrm flipV="1">
-            <a:off x="1137561" y="2295704"/>
+            <a:off x="1137563" y="2295704"/>
             <a:ext cx="2635463" cy="3764"/>
           </a:xfrm>
           <a:prstGeom prst="straightConnector1">
@@ -5744,7 +5703,7 @@
         </p:nvSpPr>
         <p:spPr>
           <a:xfrm>
-            <a:off x="3830595" y="2061739"/>
+            <a:off x="3830597" y="2061741"/>
             <a:ext cx="123369" cy="237729"/>
           </a:xfrm>
           <a:prstGeom prst="rect">
@@ -5845,7 +5804,7 @@
         </p:nvCxnSpPr>
         <p:spPr>
           <a:xfrm>
-            <a:off x="6629400" y="4495800"/>
+            <a:off x="6629402" y="4495800"/>
             <a:ext cx="1625033" cy="0"/>
           </a:xfrm>
           <a:prstGeom prst="straightConnector1">
@@ -5961,6 +5920,600 @@
             <a:r>
               <a:rPr lang="en-US" sz="1200" dirty="0"/>
               <a:t>commitTravelBuddy()</a:t>
+            </a:r>
+          </a:p>
+        </p:txBody>
+      </p:sp>
+      <p:sp>
+        <p:nvSpPr>
+          <p:cNvPr id="3" name="Oval 2">
+            <a:extLst>
+              <a:ext uri="{FF2B5EF4-FFF2-40B4-BE49-F238E27FC236}">
+                <a16:creationId xmlns:a16="http://schemas.microsoft.com/office/drawing/2014/main" id="{AA3F59F5-38C6-4F19-AFF5-C0101AE667B9}"/>
+              </a:ext>
+            </a:extLst>
+          </p:cNvPr>
+          <p:cNvSpPr/>
+          <p:nvPr/>
+        </p:nvSpPr>
+        <p:spPr>
+          <a:xfrm>
+            <a:off x="-2743200" y="1905000"/>
+            <a:ext cx="341838" cy="337594"/>
+          </a:xfrm>
+          <a:prstGeom prst="ellipse">
+            <a:avLst/>
+          </a:prstGeom>
+          <a:solidFill>
+            <a:schemeClr val="tx1"/>
+          </a:solidFill>
+        </p:spPr>
+        <p:style>
+          <a:lnRef idx="2">
+            <a:schemeClr val="accent1">
+              <a:shade val="50000"/>
+            </a:schemeClr>
+          </a:lnRef>
+          <a:fillRef idx="1">
+            <a:schemeClr val="accent1"/>
+          </a:fillRef>
+          <a:effectRef idx="0">
+            <a:schemeClr val="accent1"/>
+          </a:effectRef>
+          <a:fontRef idx="minor">
+            <a:schemeClr val="lt1"/>
+          </a:fontRef>
+        </p:style>
+        <p:txBody>
+          <a:bodyPr rot="0" spcFirstLastPara="0" vertOverflow="overflow" horzOverflow="overflow" vert="horz" wrap="square" lIns="91440" tIns="45720" rIns="91440" bIns="45720" numCol="1" spcCol="0" rtlCol="0" fromWordArt="0" anchor="ctr" anchorCtr="0" forceAA="0" compatLnSpc="1">
+            <a:prstTxWarp prst="textNoShape">
+              <a:avLst/>
+            </a:prstTxWarp>
+            <a:noAutofit/>
+          </a:bodyPr>
+          <a:lstStyle/>
+          <a:p>
+            <a:pPr algn="ctr"/>
+            <a:r>
+              <a:rPr lang="en-SG" dirty="0"/>
+              <a:t>1</a:t>
+            </a:r>
+          </a:p>
+        </p:txBody>
+      </p:sp>
+      <p:sp>
+        <p:nvSpPr>
+          <p:cNvPr id="64" name="Oval 63">
+            <a:extLst>
+              <a:ext uri="{FF2B5EF4-FFF2-40B4-BE49-F238E27FC236}">
+                <a16:creationId xmlns:a16="http://schemas.microsoft.com/office/drawing/2014/main" id="{F0118FE5-0FCC-4157-8534-D8DEEC777152}"/>
+              </a:ext>
+            </a:extLst>
+          </p:cNvPr>
+          <p:cNvSpPr/>
+          <p:nvPr/>
+        </p:nvSpPr>
+        <p:spPr>
+          <a:xfrm>
+            <a:off x="-310093" y="1944821"/>
+            <a:ext cx="341838" cy="337594"/>
+          </a:xfrm>
+          <a:prstGeom prst="ellipse">
+            <a:avLst/>
+          </a:prstGeom>
+          <a:solidFill>
+            <a:schemeClr val="tx1"/>
+          </a:solidFill>
+        </p:spPr>
+        <p:style>
+          <a:lnRef idx="2">
+            <a:schemeClr val="accent1">
+              <a:shade val="50000"/>
+            </a:schemeClr>
+          </a:lnRef>
+          <a:fillRef idx="1">
+            <a:schemeClr val="accent1"/>
+          </a:fillRef>
+          <a:effectRef idx="0">
+            <a:schemeClr val="accent1"/>
+          </a:effectRef>
+          <a:fontRef idx="minor">
+            <a:schemeClr val="lt1"/>
+          </a:fontRef>
+        </p:style>
+        <p:txBody>
+          <a:bodyPr rot="0" spcFirstLastPara="0" vertOverflow="overflow" horzOverflow="overflow" vert="horz" wrap="square" lIns="91440" tIns="45720" rIns="91440" bIns="45720" numCol="1" spcCol="0" rtlCol="0" fromWordArt="0" anchor="ctr" anchorCtr="0" forceAA="0" compatLnSpc="1">
+            <a:prstTxWarp prst="textNoShape">
+              <a:avLst/>
+            </a:prstTxWarp>
+            <a:noAutofit/>
+          </a:bodyPr>
+          <a:lstStyle/>
+          <a:p>
+            <a:pPr algn="ctr"/>
+            <a:r>
+              <a:rPr lang="en-SG" dirty="0"/>
+              <a:t>2</a:t>
+            </a:r>
+          </a:p>
+        </p:txBody>
+      </p:sp>
+      <p:sp>
+        <p:nvSpPr>
+          <p:cNvPr id="65" name="Oval 64">
+            <a:extLst>
+              <a:ext uri="{FF2B5EF4-FFF2-40B4-BE49-F238E27FC236}">
+                <a16:creationId xmlns:a16="http://schemas.microsoft.com/office/drawing/2014/main" id="{66C6903B-703D-497F-8AC9-417F26E09F25}"/>
+              </a:ext>
+            </a:extLst>
+          </p:cNvPr>
+          <p:cNvSpPr/>
+          <p:nvPr/>
+        </p:nvSpPr>
+        <p:spPr>
+          <a:xfrm>
+            <a:off x="2295186" y="2632290"/>
+            <a:ext cx="341838" cy="337594"/>
+          </a:xfrm>
+          <a:prstGeom prst="ellipse">
+            <a:avLst/>
+          </a:prstGeom>
+          <a:solidFill>
+            <a:schemeClr val="tx1"/>
+          </a:solidFill>
+        </p:spPr>
+        <p:style>
+          <a:lnRef idx="2">
+            <a:schemeClr val="accent1">
+              <a:shade val="50000"/>
+            </a:schemeClr>
+          </a:lnRef>
+          <a:fillRef idx="1">
+            <a:schemeClr val="accent1"/>
+          </a:fillRef>
+          <a:effectRef idx="0">
+            <a:schemeClr val="accent1"/>
+          </a:effectRef>
+          <a:fontRef idx="minor">
+            <a:schemeClr val="lt1"/>
+          </a:fontRef>
+        </p:style>
+        <p:txBody>
+          <a:bodyPr rot="0" spcFirstLastPara="0" vertOverflow="overflow" horzOverflow="overflow" vert="horz" wrap="square" lIns="91440" tIns="45720" rIns="91440" bIns="45720" numCol="1" spcCol="0" rtlCol="0" fromWordArt="0" anchor="ctr" anchorCtr="0" forceAA="0" compatLnSpc="1">
+            <a:prstTxWarp prst="textNoShape">
+              <a:avLst/>
+            </a:prstTxWarp>
+            <a:noAutofit/>
+          </a:bodyPr>
+          <a:lstStyle/>
+          <a:p>
+            <a:pPr algn="ctr"/>
+            <a:r>
+              <a:rPr lang="en-SG" dirty="0"/>
+              <a:t>3</a:t>
+            </a:r>
+          </a:p>
+        </p:txBody>
+      </p:sp>
+      <p:sp>
+        <p:nvSpPr>
+          <p:cNvPr id="70" name="Oval 69">
+            <a:extLst>
+              <a:ext uri="{FF2B5EF4-FFF2-40B4-BE49-F238E27FC236}">
+                <a16:creationId xmlns:a16="http://schemas.microsoft.com/office/drawing/2014/main" id="{C3FC2940-5F15-4788-A33C-5025A4C2F6FE}"/>
+              </a:ext>
+            </a:extLst>
+          </p:cNvPr>
+          <p:cNvSpPr/>
+          <p:nvPr/>
+        </p:nvSpPr>
+        <p:spPr>
+          <a:xfrm>
+            <a:off x="4878219" y="3143277"/>
+            <a:ext cx="341838" cy="337594"/>
+          </a:xfrm>
+          <a:prstGeom prst="ellipse">
+            <a:avLst/>
+          </a:prstGeom>
+          <a:solidFill>
+            <a:schemeClr val="tx1"/>
+          </a:solidFill>
+        </p:spPr>
+        <p:style>
+          <a:lnRef idx="2">
+            <a:schemeClr val="accent1">
+              <a:shade val="50000"/>
+            </a:schemeClr>
+          </a:lnRef>
+          <a:fillRef idx="1">
+            <a:schemeClr val="accent1"/>
+          </a:fillRef>
+          <a:effectRef idx="0">
+            <a:schemeClr val="accent1"/>
+          </a:effectRef>
+          <a:fontRef idx="minor">
+            <a:schemeClr val="lt1"/>
+          </a:fontRef>
+        </p:style>
+        <p:txBody>
+          <a:bodyPr rot="0" spcFirstLastPara="0" vertOverflow="overflow" horzOverflow="overflow" vert="horz" wrap="square" lIns="91440" tIns="45720" rIns="91440" bIns="45720" numCol="1" spcCol="0" rtlCol="0" fromWordArt="0" anchor="ctr" anchorCtr="0" forceAA="0" compatLnSpc="1">
+            <a:prstTxWarp prst="textNoShape">
+              <a:avLst/>
+            </a:prstTxWarp>
+            <a:noAutofit/>
+          </a:bodyPr>
+          <a:lstStyle/>
+          <a:p>
+            <a:pPr algn="ctr"/>
+            <a:r>
+              <a:rPr lang="en-SG" dirty="0"/>
+              <a:t>4</a:t>
+            </a:r>
+          </a:p>
+        </p:txBody>
+      </p:sp>
+      <p:sp>
+        <p:nvSpPr>
+          <p:cNvPr id="71" name="TextBox 70">
+            <a:extLst>
+              <a:ext uri="{FF2B5EF4-FFF2-40B4-BE49-F238E27FC236}">
+                <a16:creationId xmlns:a16="http://schemas.microsoft.com/office/drawing/2014/main" id="{99E9FC63-A362-4636-ABDF-7769954CB50B}"/>
+              </a:ext>
+            </a:extLst>
+          </p:cNvPr>
+          <p:cNvSpPr txBox="1"/>
+          <p:nvPr/>
+        </p:nvSpPr>
+        <p:spPr>
+          <a:xfrm>
+            <a:off x="2292861" y="2982504"/>
+            <a:ext cx="269164" cy="215444"/>
+          </a:xfrm>
+          <a:prstGeom prst="rect">
+            <a:avLst/>
+          </a:prstGeom>
+          <a:noFill/>
+        </p:spPr>
+        <p:txBody>
+          <a:bodyPr wrap="square" lIns="0" tIns="0" rIns="0" bIns="0" rtlCol="0">
+            <a:spAutoFit/>
+          </a:bodyPr>
+          <a:lstStyle>
+            <a:defPPr>
+              <a:defRPr lang="en-US"/>
+            </a:defPPr>
+            <a:lvl1pPr algn="r">
+              <a:defRPr sz="1400">
+                <a:solidFill>
+                  <a:srgbClr val="0070C0"/>
+                </a:solidFill>
+              </a:defRPr>
+            </a:lvl1pPr>
+          </a:lstStyle>
+          <a:p>
+            <a:r>
+              <a:rPr lang="en-US" dirty="0"/>
+              <a:t>a</a:t>
+            </a:r>
+          </a:p>
+        </p:txBody>
+      </p:sp>
+      <p:sp>
+        <p:nvSpPr>
+          <p:cNvPr id="73" name="TextBox 72">
+            <a:extLst>
+              <a:ext uri="{FF2B5EF4-FFF2-40B4-BE49-F238E27FC236}">
+                <a16:creationId xmlns:a16="http://schemas.microsoft.com/office/drawing/2014/main" id="{D5847B9A-183B-4BC1-AB19-A64BC8D3F00E}"/>
+              </a:ext>
+            </a:extLst>
+          </p:cNvPr>
+          <p:cNvSpPr txBox="1"/>
+          <p:nvPr/>
+        </p:nvSpPr>
+        <p:spPr>
+          <a:xfrm>
+            <a:off x="-419982" y="3108787"/>
+            <a:ext cx="269164" cy="215444"/>
+          </a:xfrm>
+          <a:prstGeom prst="rect">
+            <a:avLst/>
+          </a:prstGeom>
+          <a:noFill/>
+        </p:spPr>
+        <p:txBody>
+          <a:bodyPr wrap="square" lIns="0" tIns="0" rIns="0" bIns="0" rtlCol="0">
+            <a:spAutoFit/>
+          </a:bodyPr>
+          <a:lstStyle>
+            <a:defPPr>
+              <a:defRPr lang="en-US"/>
+            </a:defPPr>
+            <a:lvl1pPr algn="r">
+              <a:defRPr sz="1400">
+                <a:solidFill>
+                  <a:srgbClr val="0070C0"/>
+                </a:solidFill>
+              </a:defRPr>
+            </a:lvl1pPr>
+          </a:lstStyle>
+          <a:p>
+            <a:r>
+              <a:rPr lang="en-US" dirty="0"/>
+              <a:t>a</a:t>
+            </a:r>
+          </a:p>
+        </p:txBody>
+      </p:sp>
+      <p:sp>
+        <p:nvSpPr>
+          <p:cNvPr id="74" name="Oval 73">
+            <a:extLst>
+              <a:ext uri="{FF2B5EF4-FFF2-40B4-BE49-F238E27FC236}">
+                <a16:creationId xmlns:a16="http://schemas.microsoft.com/office/drawing/2014/main" id="{5490FF81-1485-49A1-BB01-B908E9039B76}"/>
+              </a:ext>
+            </a:extLst>
+          </p:cNvPr>
+          <p:cNvSpPr/>
+          <p:nvPr/>
+        </p:nvSpPr>
+        <p:spPr>
+          <a:xfrm>
+            <a:off x="2220187" y="3934966"/>
+            <a:ext cx="341838" cy="337594"/>
+          </a:xfrm>
+          <a:prstGeom prst="ellipse">
+            <a:avLst/>
+          </a:prstGeom>
+          <a:solidFill>
+            <a:schemeClr val="tx1"/>
+          </a:solidFill>
+        </p:spPr>
+        <p:style>
+          <a:lnRef idx="2">
+            <a:schemeClr val="accent1">
+              <a:shade val="50000"/>
+            </a:schemeClr>
+          </a:lnRef>
+          <a:fillRef idx="1">
+            <a:schemeClr val="accent1"/>
+          </a:fillRef>
+          <a:effectRef idx="0">
+            <a:schemeClr val="accent1"/>
+          </a:effectRef>
+          <a:fontRef idx="minor">
+            <a:schemeClr val="lt1"/>
+          </a:fontRef>
+        </p:style>
+        <p:txBody>
+          <a:bodyPr rot="0" spcFirstLastPara="0" vertOverflow="overflow" horzOverflow="overflow" vert="horz" wrap="square" lIns="91440" tIns="45720" rIns="91440" bIns="45720" numCol="1" spcCol="0" rtlCol="0" fromWordArt="0" anchor="ctr" anchorCtr="0" forceAA="0" compatLnSpc="1">
+            <a:prstTxWarp prst="textNoShape">
+              <a:avLst/>
+            </a:prstTxWarp>
+            <a:noAutofit/>
+          </a:bodyPr>
+          <a:lstStyle/>
+          <a:p>
+            <a:pPr algn="ctr"/>
+            <a:r>
+              <a:rPr lang="en-SG" dirty="0"/>
+              <a:t>5</a:t>
+            </a:r>
+          </a:p>
+        </p:txBody>
+      </p:sp>
+      <p:sp>
+        <p:nvSpPr>
+          <p:cNvPr id="75" name="Oval 74">
+            <a:extLst>
+              <a:ext uri="{FF2B5EF4-FFF2-40B4-BE49-F238E27FC236}">
+                <a16:creationId xmlns:a16="http://schemas.microsoft.com/office/drawing/2014/main" id="{A63D32A6-BB96-48B2-A4D8-673F35ACFCD0}"/>
+              </a:ext>
+            </a:extLst>
+          </p:cNvPr>
+          <p:cNvSpPr/>
+          <p:nvPr/>
+        </p:nvSpPr>
+        <p:spPr>
+          <a:xfrm>
+            <a:off x="7303409" y="3445700"/>
+            <a:ext cx="341838" cy="337594"/>
+          </a:xfrm>
+          <a:prstGeom prst="ellipse">
+            <a:avLst/>
+          </a:prstGeom>
+          <a:solidFill>
+            <a:schemeClr val="tx1"/>
+          </a:solidFill>
+        </p:spPr>
+        <p:style>
+          <a:lnRef idx="2">
+            <a:schemeClr val="accent1">
+              <a:shade val="50000"/>
+            </a:schemeClr>
+          </a:lnRef>
+          <a:fillRef idx="1">
+            <a:schemeClr val="accent1"/>
+          </a:fillRef>
+          <a:effectRef idx="0">
+            <a:schemeClr val="accent1"/>
+          </a:effectRef>
+          <a:fontRef idx="minor">
+            <a:schemeClr val="lt1"/>
+          </a:fontRef>
+        </p:style>
+        <p:txBody>
+          <a:bodyPr rot="0" spcFirstLastPara="0" vertOverflow="overflow" horzOverflow="overflow" vert="horz" wrap="square" lIns="91440" tIns="45720" rIns="91440" bIns="45720" numCol="1" spcCol="0" rtlCol="0" fromWordArt="0" anchor="ctr" anchorCtr="0" forceAA="0" compatLnSpc="1">
+            <a:prstTxWarp prst="textNoShape">
+              <a:avLst/>
+            </a:prstTxWarp>
+            <a:noAutofit/>
+          </a:bodyPr>
+          <a:lstStyle/>
+          <a:p>
+            <a:pPr algn="ctr"/>
+            <a:r>
+              <a:rPr lang="en-SG" dirty="0"/>
+              <a:t>6</a:t>
+            </a:r>
+          </a:p>
+        </p:txBody>
+      </p:sp>
+      <p:sp>
+        <p:nvSpPr>
+          <p:cNvPr id="76" name="Oval 75">
+            <a:extLst>
+              <a:ext uri="{FF2B5EF4-FFF2-40B4-BE49-F238E27FC236}">
+                <a16:creationId xmlns:a16="http://schemas.microsoft.com/office/drawing/2014/main" id="{CEB10DB6-4DE2-438E-9676-9844E7F2EB87}"/>
+              </a:ext>
+            </a:extLst>
+          </p:cNvPr>
+          <p:cNvSpPr/>
+          <p:nvPr/>
+        </p:nvSpPr>
+        <p:spPr>
+          <a:xfrm>
+            <a:off x="2238081" y="4876800"/>
+            <a:ext cx="341838" cy="337594"/>
+          </a:xfrm>
+          <a:prstGeom prst="ellipse">
+            <a:avLst/>
+          </a:prstGeom>
+          <a:solidFill>
+            <a:schemeClr val="tx1"/>
+          </a:solidFill>
+        </p:spPr>
+        <p:style>
+          <a:lnRef idx="2">
+            <a:schemeClr val="accent1">
+              <a:shade val="50000"/>
+            </a:schemeClr>
+          </a:lnRef>
+          <a:fillRef idx="1">
+            <a:schemeClr val="accent1"/>
+          </a:fillRef>
+          <a:effectRef idx="0">
+            <a:schemeClr val="accent1"/>
+          </a:effectRef>
+          <a:fontRef idx="minor">
+            <a:schemeClr val="lt1"/>
+          </a:fontRef>
+        </p:style>
+        <p:txBody>
+          <a:bodyPr rot="0" spcFirstLastPara="0" vertOverflow="overflow" horzOverflow="overflow" vert="horz" wrap="square" lIns="91440" tIns="45720" rIns="91440" bIns="45720" numCol="1" spcCol="0" rtlCol="0" fromWordArt="0" anchor="ctr" anchorCtr="0" forceAA="0" compatLnSpc="1">
+            <a:prstTxWarp prst="textNoShape">
+              <a:avLst/>
+            </a:prstTxWarp>
+            <a:noAutofit/>
+          </a:bodyPr>
+          <a:lstStyle/>
+          <a:p>
+            <a:pPr algn="ctr"/>
+            <a:r>
+              <a:rPr lang="en-SG" dirty="0"/>
+              <a:t>7</a:t>
+            </a:r>
+          </a:p>
+        </p:txBody>
+      </p:sp>
+      <p:sp>
+        <p:nvSpPr>
+          <p:cNvPr id="77" name="TextBox 76">
+            <a:extLst>
+              <a:ext uri="{FF2B5EF4-FFF2-40B4-BE49-F238E27FC236}">
+                <a16:creationId xmlns:a16="http://schemas.microsoft.com/office/drawing/2014/main" id="{5DF305EA-88A9-4808-8FD4-FF8CFE26FBA4}"/>
+              </a:ext>
+            </a:extLst>
+          </p:cNvPr>
+          <p:cNvSpPr txBox="1"/>
+          <p:nvPr/>
+        </p:nvSpPr>
+        <p:spPr>
+          <a:xfrm>
+            <a:off x="1869681" y="4541094"/>
+            <a:ext cx="762000" cy="215444"/>
+          </a:xfrm>
+          <a:prstGeom prst="rect">
+            <a:avLst/>
+          </a:prstGeom>
+          <a:noFill/>
+        </p:spPr>
+        <p:txBody>
+          <a:bodyPr wrap="square" lIns="0" tIns="0" rIns="0" bIns="0" rtlCol="0">
+            <a:spAutoFit/>
+          </a:bodyPr>
+          <a:lstStyle>
+            <a:defPPr>
+              <a:defRPr lang="en-US"/>
+            </a:defPPr>
+            <a:lvl1pPr algn="r">
+              <a:defRPr sz="1400">
+                <a:solidFill>
+                  <a:srgbClr val="0070C0"/>
+                </a:solidFill>
+              </a:defRPr>
+            </a:lvl1pPr>
+          </a:lstStyle>
+          <a:p>
+            <a:r>
+              <a:rPr lang="en-US" dirty="0"/>
+              <a:t>result</a:t>
+            </a:r>
+          </a:p>
+        </p:txBody>
+      </p:sp>
+      <p:sp>
+        <p:nvSpPr>
+          <p:cNvPr id="78" name="Oval 77">
+            <a:extLst>
+              <a:ext uri="{FF2B5EF4-FFF2-40B4-BE49-F238E27FC236}">
+                <a16:creationId xmlns:a16="http://schemas.microsoft.com/office/drawing/2014/main" id="{D81E3635-A682-4904-B92F-18D8E8A8DEBF}"/>
+              </a:ext>
+            </a:extLst>
+          </p:cNvPr>
+          <p:cNvSpPr/>
+          <p:nvPr/>
+        </p:nvSpPr>
+        <p:spPr>
+          <a:xfrm>
+            <a:off x="-2226775" y="4918797"/>
+            <a:ext cx="341838" cy="337594"/>
+          </a:xfrm>
+          <a:prstGeom prst="ellipse">
+            <a:avLst/>
+          </a:prstGeom>
+          <a:solidFill>
+            <a:schemeClr val="tx1"/>
+          </a:solidFill>
+        </p:spPr>
+        <p:style>
+          <a:lnRef idx="2">
+            <a:schemeClr val="accent1">
+              <a:shade val="50000"/>
+            </a:schemeClr>
+          </a:lnRef>
+          <a:fillRef idx="1">
+            <a:schemeClr val="accent1"/>
+          </a:fillRef>
+          <a:effectRef idx="0">
+            <a:schemeClr val="accent1"/>
+          </a:effectRef>
+          <a:fontRef idx="minor">
+            <a:schemeClr val="lt1"/>
+          </a:fontRef>
+        </p:style>
+        <p:txBody>
+          <a:bodyPr rot="0" spcFirstLastPara="0" vertOverflow="overflow" horzOverflow="overflow" vert="horz" wrap="square" lIns="91440" tIns="45720" rIns="91440" bIns="45720" numCol="1" spcCol="0" rtlCol="0" fromWordArt="0" anchor="ctr" anchorCtr="0" forceAA="0" compatLnSpc="1">
+            <a:prstTxWarp prst="textNoShape">
+              <a:avLst/>
+            </a:prstTxWarp>
+            <a:noAutofit/>
+          </a:bodyPr>
+          <a:lstStyle/>
+          <a:p>
+            <a:pPr algn="ctr"/>
+            <a:r>
+              <a:rPr lang="en-SG" dirty="0"/>
+              <a:t>8</a:t>
             </a:r>
           </a:p>
         </p:txBody>

</xml_diff>